<commit_message>
Adding remastered slides on rvalue references, minor fixes to others
git-svn-id: https://svn.code.sf.net/p/cpp-lects-rus/code/trunk@211 39143b06-f351-456c-9f92-4cd32fad6823
</commit_message>
<xml_diff>
--- a/slides/sep2017/02-preprocessor.pptx
+++ b/slides/sep2017/02-preprocessor.pptx
@@ -64,7 +64,8 @@
     <p:sldId id="309" r:id="rId58"/>
     <p:sldId id="310" r:id="rId59"/>
     <p:sldId id="311" r:id="rId60"/>
-    <p:sldId id="258" r:id="rId61"/>
+    <p:sldId id="318" r:id="rId61"/>
+    <p:sldId id="258" r:id="rId62"/>
   </p:sldIdLst>
   <p:sldSz cx="12192000" cy="6858000"/>
   <p:notesSz cx="6858000" cy="9144000"/>
@@ -368,7 +369,7 @@
             <a:fld id="{96DFF08F-DC6B-4601-B491-B0F83F6DD2DA}" type="datetimeFigureOut">
               <a:rPr lang="en-US" dirty="0"/>
               <a:pPr/>
-              <a:t>8/12/2017</a:t>
+              <a:t>8/15/2017</a:t>
             </a:fld>
             <a:endParaRPr lang="en-US" dirty="0"/>
           </a:p>
@@ -585,7 +586,7 @@
           <a:p>
             <a:fld id="{96DFF08F-DC6B-4601-B491-B0F83F6DD2DA}" type="datetimeFigureOut">
               <a:rPr lang="en-US" dirty="0"/>
-              <a:t>8/12/2017</a:t>
+              <a:t>8/15/2017</a:t>
             </a:fld>
             <a:endParaRPr lang="en-US" dirty="0"/>
           </a:p>
@@ -760,7 +761,7 @@
           <a:p>
             <a:fld id="{96DFF08F-DC6B-4601-B491-B0F83F6DD2DA}" type="datetimeFigureOut">
               <a:rPr lang="en-US" dirty="0"/>
-              <a:t>8/12/2017</a:t>
+              <a:t>8/15/2017</a:t>
             </a:fld>
             <a:endParaRPr lang="en-US" dirty="0"/>
           </a:p>
@@ -925,7 +926,7 @@
           <a:p>
             <a:fld id="{96DFF08F-DC6B-4601-B491-B0F83F6DD2DA}" type="datetimeFigureOut">
               <a:rPr lang="en-US" dirty="0"/>
-              <a:t>8/12/2017</a:t>
+              <a:t>8/15/2017</a:t>
             </a:fld>
             <a:endParaRPr lang="en-US" dirty="0"/>
           </a:p>
@@ -1171,7 +1172,7 @@
           <a:p>
             <a:fld id="{96DFF08F-DC6B-4601-B491-B0F83F6DD2DA}" type="datetimeFigureOut">
               <a:rPr lang="en-US" dirty="0"/>
-              <a:t>8/12/2017</a:t>
+              <a:t>8/15/2017</a:t>
             </a:fld>
             <a:endParaRPr lang="en-US" dirty="0"/>
           </a:p>
@@ -1489,7 +1490,7 @@
           <a:p>
             <a:fld id="{96DFF08F-DC6B-4601-B491-B0F83F6DD2DA}" type="datetimeFigureOut">
               <a:rPr lang="en-US" dirty="0"/>
-              <a:t>8/12/2017</a:t>
+              <a:t>8/15/2017</a:t>
             </a:fld>
             <a:endParaRPr lang="en-US" dirty="0"/>
           </a:p>
@@ -1908,7 +1909,7 @@
           <a:p>
             <a:fld id="{96DFF08F-DC6B-4601-B491-B0F83F6DD2DA}" type="datetimeFigureOut">
               <a:rPr lang="en-US" dirty="0"/>
-              <a:t>8/12/2017</a:t>
+              <a:t>8/15/2017</a:t>
             </a:fld>
             <a:endParaRPr lang="en-US" dirty="0"/>
           </a:p>
@@ -2021,7 +2022,7 @@
           <a:p>
             <a:fld id="{96DFF08F-DC6B-4601-B491-B0F83F6DD2DA}" type="datetimeFigureOut">
               <a:rPr lang="en-US" dirty="0"/>
-              <a:t>8/12/2017</a:t>
+              <a:t>8/15/2017</a:t>
             </a:fld>
             <a:endParaRPr lang="en-US" dirty="0"/>
           </a:p>
@@ -2111,7 +2112,7 @@
           <a:p>
             <a:fld id="{96DFF08F-DC6B-4601-B491-B0F83F6DD2DA}" type="datetimeFigureOut">
               <a:rPr lang="en-US" dirty="0"/>
-              <a:t>8/12/2017</a:t>
+              <a:t>8/15/2017</a:t>
             </a:fld>
             <a:endParaRPr lang="en-US" dirty="0"/>
           </a:p>
@@ -2396,7 +2397,7 @@
           <a:p>
             <a:fld id="{96DFF08F-DC6B-4601-B491-B0F83F6DD2DA}" type="datetimeFigureOut">
               <a:rPr lang="en-US" dirty="0"/>
-              <a:t>8/12/2017</a:t>
+              <a:t>8/15/2017</a:t>
             </a:fld>
             <a:endParaRPr lang="en-US" dirty="0"/>
           </a:p>
@@ -2663,7 +2664,7 @@
           <a:p>
             <a:fld id="{96DFF08F-DC6B-4601-B491-B0F83F6DD2DA}" type="datetimeFigureOut">
               <a:rPr lang="en-US" dirty="0"/>
-              <a:t>8/12/2017</a:t>
+              <a:t>8/15/2017</a:t>
             </a:fld>
             <a:endParaRPr lang="en-US" dirty="0"/>
           </a:p>
@@ -2912,7 +2913,7 @@
             <a:fld id="{96DFF08F-DC6B-4601-B491-B0F83F6DD2DA}" type="datetimeFigureOut">
               <a:rPr lang="en-US" dirty="0"/>
               <a:pPr/>
-              <a:t>8/12/2017</a:t>
+              <a:t>8/15/2017</a:t>
             </a:fld>
             <a:endParaRPr lang="en-US" dirty="0"/>
           </a:p>
@@ -3417,15 +3418,7 @@
           <a:p>
             <a:r>
               <a:rPr lang="ru-RU" smtClean="0"/>
-              <a:t>Особенности использования, </a:t>
-            </a:r>
-            <a:r>
-              <a:rPr lang="ru-RU" smtClean="0"/>
-              <a:t>переход к обобщённым </a:t>
-            </a:r>
-            <a:r>
-              <a:rPr lang="ru-RU" smtClean="0"/>
-              <a:t>функциям, инстанцирование, подстановка и вывод типов</a:t>
+              <a:t>Особенности использования, переход к обобщённым функциям, инстанцирование, подстановка и вывод типов</a:t>
             </a:r>
             <a:endParaRPr lang="en-US"/>
           </a:p>
@@ -4998,7 +4991,6 @@
               <a:rPr lang="en-US" smtClean="0"/>
               <a:t>using</a:t>
             </a:r>
-            <a:endParaRPr lang="en-US" smtClean="0"/>
           </a:p>
           <a:p>
             <a:pPr marL="45720" indent="0">
@@ -5008,13 +5000,7 @@
               <a:rPr lang="en-US" smtClean="0">
                 <a:latin typeface="Consolas" panose="020B0609020204030204" pitchFamily="49" charset="0"/>
               </a:rPr>
-              <a:t>#</a:t>
-            </a:r>
-            <a:r>
-              <a:rPr lang="en-US" smtClean="0">
-                <a:latin typeface="Consolas" panose="020B0609020204030204" pitchFamily="49" charset="0"/>
-              </a:rPr>
-              <a:t>define int* PINT</a:t>
+              <a:t>#define int* PINT</a:t>
             </a:r>
           </a:p>
           <a:p>
@@ -5045,11 +5031,7 @@
           <a:p>
             <a:r>
               <a:rPr lang="ru-RU" smtClean="0"/>
-              <a:t>Обсуждение. Есть </a:t>
-            </a:r>
-            <a:r>
-              <a:rPr lang="ru-RU" smtClean="0"/>
-              <a:t>ли разница:</a:t>
+              <a:t>Обсуждение. Есть ли разница:</a:t>
             </a:r>
           </a:p>
           <a:p>
@@ -5174,7 +5156,6 @@
               <a:rPr lang="en-US" smtClean="0"/>
               <a:t>using</a:t>
             </a:r>
-            <a:endParaRPr lang="en-US" smtClean="0"/>
           </a:p>
           <a:p>
             <a:pPr marL="45720" indent="0">
@@ -5184,13 +5165,7 @@
               <a:rPr lang="en-US" smtClean="0">
                 <a:latin typeface="Consolas" panose="020B0609020204030204" pitchFamily="49" charset="0"/>
               </a:rPr>
-              <a:t>#</a:t>
-            </a:r>
-            <a:r>
-              <a:rPr lang="en-US" smtClean="0">
-                <a:latin typeface="Consolas" panose="020B0609020204030204" pitchFamily="49" charset="0"/>
-              </a:rPr>
-              <a:t>define int* PINT</a:t>
+              <a:t>#define int* PINT</a:t>
             </a:r>
           </a:p>
           <a:p>
@@ -5221,11 +5196,7 @@
           <a:p>
             <a:r>
               <a:rPr lang="ru-RU" smtClean="0"/>
-              <a:t>Обсуждение. Есть </a:t>
-            </a:r>
-            <a:r>
-              <a:rPr lang="ru-RU" smtClean="0"/>
-              <a:t>ли разница:</a:t>
+              <a:t>Обсуждение. Есть ли разница:</a:t>
             </a:r>
           </a:p>
           <a:p>
@@ -5236,13 +5207,7 @@
               <a:rPr lang="en-US" smtClean="0">
                 <a:latin typeface="Consolas" panose="020B0609020204030204" pitchFamily="49" charset="0"/>
               </a:rPr>
-              <a:t>PINT a, b</a:t>
-            </a:r>
-            <a:r>
-              <a:rPr lang="en-US" smtClean="0">
-                <a:latin typeface="Consolas" panose="020B0609020204030204" pitchFamily="49" charset="0"/>
-              </a:rPr>
-              <a:t>;</a:t>
+              <a:t>PINT a, b;</a:t>
             </a:r>
             <a:r>
               <a:rPr lang="ru-RU" smtClean="0">
@@ -5274,13 +5239,7 @@
               <a:rPr lang="en-US" smtClean="0">
                 <a:latin typeface="Consolas" panose="020B0609020204030204" pitchFamily="49" charset="0"/>
               </a:rPr>
-              <a:t>pint c, d</a:t>
-            </a:r>
-            <a:r>
-              <a:rPr lang="en-US" smtClean="0">
-                <a:latin typeface="Consolas" panose="020B0609020204030204" pitchFamily="49" charset="0"/>
-              </a:rPr>
-              <a:t>;</a:t>
+              <a:t>pint c, d;</a:t>
             </a:r>
             <a:r>
               <a:rPr lang="ru-RU" smtClean="0">
@@ -5375,13 +5334,7 @@
               <a:rPr lang="en-US" smtClean="0">
                 <a:latin typeface="Consolas" panose="020B0609020204030204" pitchFamily="49" charset="0"/>
               </a:rPr>
-              <a:t>pint_t e, f</a:t>
-            </a:r>
-            <a:r>
-              <a:rPr lang="en-US" smtClean="0">
-                <a:latin typeface="Consolas" panose="020B0609020204030204" pitchFamily="49" charset="0"/>
-              </a:rPr>
-              <a:t>;</a:t>
+              <a:t>pint_t e, f;</a:t>
             </a:r>
             <a:r>
               <a:rPr lang="ru-RU" smtClean="0">
@@ -5434,12 +5387,6 @@
               </a:rPr>
               <a:t>b;</a:t>
             </a:r>
-            <a:endParaRPr lang="en-US">
-              <a:solidFill>
-                <a:srgbClr val="0000FF"/>
-              </a:solidFill>
-              <a:latin typeface="Consolas" panose="020B0609020204030204" pitchFamily="49" charset="0"/>
-            </a:endParaRPr>
           </a:p>
         </p:txBody>
       </p:sp>
@@ -5923,19 +5870,7 @@
               <a:rPr lang="en-US" smtClean="0">
                 <a:latin typeface="Consolas" panose="020B0609020204030204" pitchFamily="49" charset="0"/>
               </a:rPr>
-              <a:t>static inline </a:t>
-            </a:r>
-            <a:r>
-              <a:rPr lang="en-US" smtClean="0">
-                <a:latin typeface="Consolas" panose="020B0609020204030204" pitchFamily="49" charset="0"/>
-              </a:rPr>
-              <a:t>int </a:t>
-            </a:r>
-            <a:r>
-              <a:rPr lang="en-US" smtClean="0">
-                <a:latin typeface="Consolas" panose="020B0609020204030204" pitchFamily="49" charset="0"/>
-              </a:rPr>
-              <a:t>max (int x, int y) { return x &gt; y ? x : y; }</a:t>
+              <a:t>static inline int max (int x, int y) { return x &gt; y ? x : y; }</a:t>
             </a:r>
           </a:p>
           <a:p>
@@ -7274,19 +7209,7 @@
               <a:rPr lang="en-US" smtClean="0">
                 <a:latin typeface="Consolas" panose="020B0609020204030204" pitchFamily="49" charset="0"/>
               </a:rPr>
-              <a:t>#define </a:t>
-            </a:r>
-            <a:r>
-              <a:rPr lang="en-US" smtClean="0">
-                <a:latin typeface="Consolas" panose="020B0609020204030204" pitchFamily="49" charset="0"/>
-              </a:rPr>
-              <a:t>Pair </a:t>
-            </a:r>
-            <a:r>
-              <a:rPr lang="en-US" smtClean="0">
-                <a:latin typeface="Consolas" panose="020B0609020204030204" pitchFamily="49" charset="0"/>
-              </a:rPr>
-              <a:t>(T1, T2) \</a:t>
+              <a:t>#define Pair (T1, T2) \</a:t>
             </a:r>
             <a:br>
               <a:rPr lang="en-US" smtClean="0">
@@ -7372,11 +7295,7 @@
           <a:p>
             <a:r>
               <a:rPr lang="ru-RU" smtClean="0"/>
-              <a:t>Что тут плохо</a:t>
-            </a:r>
-            <a:r>
-              <a:rPr lang="ru-RU" smtClean="0"/>
-              <a:t>? Вопрос в общем риторический...</a:t>
+              <a:t>Что тут плохо? Вопрос в общем риторический...</a:t>
             </a:r>
             <a:r>
               <a:rPr lang="en-US" smtClean="0"/>
@@ -8320,7 +8239,6 @@
               <a:rPr lang="ru-RU" smtClean="0"/>
               <a:t>Базовые правила: </a:t>
             </a:r>
-            <a:endParaRPr lang="ru-RU" smtClean="0"/>
           </a:p>
           <a:p>
             <a:pPr marL="731520" lvl="1" indent="-457200">
@@ -8333,15 +8251,7 @@
                   <a:srgbClr val="0000FF"/>
                 </a:solidFill>
               </a:rPr>
-              <a:t>определение </a:t>
-            </a:r>
-            <a:r>
-              <a:rPr lang="ru-RU" smtClean="0">
-                <a:solidFill>
-                  <a:srgbClr val="0000FF"/>
-                </a:solidFill>
-              </a:rPr>
-              <a:t>аргументов осуществляется сверху вниз в один проход</a:t>
+              <a:t>определение аргументов осуществляется сверху вниз в один проход</a:t>
             </a:r>
           </a:p>
           <a:p>
@@ -8608,7 +8518,6 @@
               <a:rPr lang="ru-RU" smtClean="0"/>
               <a:t>Базовые правила: </a:t>
             </a:r>
-            <a:endParaRPr lang="ru-RU" smtClean="0"/>
           </a:p>
           <a:p>
             <a:pPr marL="731520" lvl="1" indent="-457200">
@@ -9034,7 +8943,6 @@
               <a:rPr lang="ru-RU" smtClean="0"/>
               <a:t>Базовые правила: </a:t>
             </a:r>
-            <a:endParaRPr lang="ru-RU" smtClean="0"/>
           </a:p>
           <a:p>
             <a:pPr marL="731520" lvl="1" indent="-457200">
@@ -9043,11 +8951,7 @@
             </a:pPr>
             <a:r>
               <a:rPr lang="ru-RU" smtClean="0"/>
-              <a:t>определение </a:t>
-            </a:r>
-            <a:r>
-              <a:rPr lang="ru-RU" smtClean="0"/>
-              <a:t>аргументов осуществляется сверху вниз в один проход</a:t>
+              <a:t>определение аргументов осуществляется сверху вниз в один проход</a:t>
             </a:r>
           </a:p>
           <a:p>
@@ -9057,11 +8961,7 @@
             </a:pPr>
             <a:r>
               <a:rPr lang="ru-RU" smtClean="0"/>
-              <a:t>раскрытие </a:t>
-            </a:r>
-            <a:r>
-              <a:rPr lang="ru-RU" smtClean="0"/>
-              <a:t>макросов происходит снизу вверх в один проход</a:t>
+              <a:t>раскрытие макросов происходит снизу вверх в один проход</a:t>
             </a:r>
           </a:p>
           <a:p>
@@ -9083,6 +8983,14 @@
                   <a:srgbClr val="0000FF"/>
                 </a:solidFill>
               </a:rPr>
+              <a:t> следствие:</a:t>
+            </a:r>
+            <a:r>
+              <a:rPr lang="en-US" smtClean="0">
+                <a:solidFill>
+                  <a:srgbClr val="0000FF"/>
+                </a:solidFill>
+              </a:rPr>
               <a:t> </a:t>
             </a:r>
             <a:r>
@@ -9091,134 +8999,287 @@
                   <a:srgbClr val="0000FF"/>
                 </a:solidFill>
               </a:rPr>
-              <a:t>следствие:</a:t>
+              <a:t>макрос или команда, полученные в результате раскрытия, не раскрываются</a:t>
+            </a:r>
+          </a:p>
+          <a:p>
+            <a:pPr marL="45720" indent="0">
+              <a:buNone/>
+            </a:pPr>
+            <a:r>
+              <a:rPr lang="en-US" smtClean="0">
+                <a:latin typeface="Consolas" panose="020B0609020204030204" pitchFamily="49" charset="0"/>
+              </a:rPr>
+              <a:t>#</a:t>
+            </a:r>
+            <a:r>
+              <a:rPr lang="en-US">
+                <a:latin typeface="Consolas" panose="020B0609020204030204" pitchFamily="49" charset="0"/>
+              </a:rPr>
+              <a:t>define </a:t>
+            </a:r>
+            <a:r>
+              <a:rPr lang="en-US" smtClean="0">
+                <a:latin typeface="Consolas" panose="020B0609020204030204" pitchFamily="49" charset="0"/>
+              </a:rPr>
+              <a:t>h_h </a:t>
+            </a:r>
+            <a:r>
+              <a:rPr lang="en-US">
+                <a:latin typeface="Consolas" panose="020B0609020204030204" pitchFamily="49" charset="0"/>
+              </a:rPr>
+              <a:t># ## </a:t>
+            </a:r>
+            <a:r>
+              <a:rPr lang="en-US" smtClean="0">
+                <a:latin typeface="Consolas" panose="020B0609020204030204" pitchFamily="49" charset="0"/>
+              </a:rPr>
+              <a:t>#</a:t>
+            </a:r>
+            <a:r>
+              <a:rPr lang="ru-RU" smtClean="0">
+                <a:latin typeface="Consolas" panose="020B0609020204030204" pitchFamily="49" charset="0"/>
+              </a:rPr>
+              <a:t/>
+            </a:r>
+            <a:br>
+              <a:rPr lang="ru-RU" smtClean="0">
+                <a:latin typeface="Consolas" panose="020B0609020204030204" pitchFamily="49" charset="0"/>
+              </a:rPr>
+            </a:br>
+            <a:r>
+              <a:rPr lang="en-US" smtClean="0">
+                <a:latin typeface="Consolas" panose="020B0609020204030204" pitchFamily="49" charset="0"/>
+              </a:rPr>
+              <a:t>#</a:t>
+            </a:r>
+            <a:r>
+              <a:rPr lang="en-US">
+                <a:latin typeface="Consolas" panose="020B0609020204030204" pitchFamily="49" charset="0"/>
+              </a:rPr>
+              <a:t>define mkstr(a) # </a:t>
+            </a:r>
+            <a:r>
+              <a:rPr lang="en-US" smtClean="0">
+                <a:latin typeface="Consolas" panose="020B0609020204030204" pitchFamily="49" charset="0"/>
+              </a:rPr>
+              <a:t>a              </a:t>
+            </a:r>
+            <a:r>
+              <a:rPr lang="en-US" smtClean="0">
+                <a:latin typeface="Consolas" panose="020B0609020204030204" pitchFamily="49" charset="0"/>
+                <a:sym typeface="Symbol" panose="05050102010706020507" pitchFamily="18" charset="2"/>
+              </a:rPr>
+              <a:t> "x </a:t>
+            </a:r>
+            <a:r>
+              <a:rPr lang="en-US" smtClean="0">
+                <a:solidFill>
+                  <a:srgbClr val="FF0000"/>
+                </a:solidFill>
+                <a:latin typeface="Consolas" panose="020B0609020204030204" pitchFamily="49" charset="0"/>
+                <a:sym typeface="Symbol" panose="05050102010706020507" pitchFamily="18" charset="2"/>
+              </a:rPr>
+              <a:t>##</a:t>
+            </a:r>
+            <a:r>
+              <a:rPr lang="en-US" smtClean="0">
+                <a:latin typeface="Consolas" panose="020B0609020204030204" pitchFamily="49" charset="0"/>
+                <a:sym typeface="Symbol" panose="05050102010706020507" pitchFamily="18" charset="2"/>
+              </a:rPr>
+              <a:t> y"</a:t>
+            </a:r>
+            <a:r>
+              <a:rPr lang="ru-RU" smtClean="0">
+                <a:latin typeface="Consolas" panose="020B0609020204030204" pitchFamily="49" charset="0"/>
+              </a:rPr>
+              <a:t/>
+            </a:r>
+            <a:br>
+              <a:rPr lang="ru-RU" smtClean="0">
+                <a:latin typeface="Consolas" panose="020B0609020204030204" pitchFamily="49" charset="0"/>
+              </a:rPr>
+            </a:br>
+            <a:r>
+              <a:rPr lang="en-US" smtClean="0">
+                <a:latin typeface="Consolas" panose="020B0609020204030204" pitchFamily="49" charset="0"/>
+              </a:rPr>
+              <a:t>#define proxy(a) mkstr(a)</a:t>
+            </a:r>
+            <a:r>
+              <a:rPr lang="ru-RU" smtClean="0">
+                <a:latin typeface="Consolas" panose="020B0609020204030204" pitchFamily="49" charset="0"/>
+              </a:rPr>
+              <a:t>         </a:t>
+            </a:r>
+            <a:r>
+              <a:rPr lang="en-US" smtClean="0">
+                <a:latin typeface="Consolas" panose="020B0609020204030204" pitchFamily="49" charset="0"/>
+                <a:sym typeface="Symbol" panose="05050102010706020507" pitchFamily="18" charset="2"/>
+              </a:rPr>
+              <a:t> mkstr(x </a:t>
+            </a:r>
+            <a:r>
+              <a:rPr lang="en-US" smtClean="0">
+                <a:solidFill>
+                  <a:srgbClr val="FF0000"/>
+                </a:solidFill>
+                <a:latin typeface="Consolas" panose="020B0609020204030204" pitchFamily="49" charset="0"/>
+                <a:sym typeface="Symbol" panose="05050102010706020507" pitchFamily="18" charset="2"/>
+              </a:rPr>
+              <a:t>##</a:t>
+            </a:r>
+            <a:r>
+              <a:rPr lang="en-US" smtClean="0">
+                <a:latin typeface="Consolas" panose="020B0609020204030204" pitchFamily="49" charset="0"/>
+                <a:sym typeface="Symbol" panose="05050102010706020507" pitchFamily="18" charset="2"/>
+              </a:rPr>
+              <a:t> y</a:t>
+            </a:r>
+            <a:r>
+              <a:rPr lang="ru-RU" smtClean="0">
+                <a:latin typeface="Consolas" panose="020B0609020204030204" pitchFamily="49" charset="0"/>
+                <a:sym typeface="Symbol" panose="05050102010706020507" pitchFamily="18" charset="2"/>
+              </a:rPr>
+              <a:t>)</a:t>
+            </a:r>
+            <a:r>
+              <a:rPr lang="en-US" smtClean="0">
+                <a:latin typeface="Consolas" panose="020B0609020204030204" pitchFamily="49" charset="0"/>
+              </a:rPr>
+              <a:t/>
+            </a:r>
+            <a:br>
+              <a:rPr lang="en-US" smtClean="0">
+                <a:latin typeface="Consolas" panose="020B0609020204030204" pitchFamily="49" charset="0"/>
+              </a:rPr>
+            </a:br>
+            <a:r>
+              <a:rPr lang="en-US" smtClean="0">
+                <a:latin typeface="Consolas" panose="020B0609020204030204" pitchFamily="49" charset="0"/>
+              </a:rPr>
+              <a:t>#define betw(a</a:t>
+            </a:r>
+            <a:r>
+              <a:rPr lang="en-US">
+                <a:latin typeface="Consolas" panose="020B0609020204030204" pitchFamily="49" charset="0"/>
+              </a:rPr>
+              <a:t>) </a:t>
+            </a:r>
+            <a:r>
+              <a:rPr lang="en-US" smtClean="0">
+                <a:latin typeface="Consolas" panose="020B0609020204030204" pitchFamily="49" charset="0"/>
+              </a:rPr>
+              <a:t>proxy(a)          </a:t>
+            </a:r>
+            <a:r>
+              <a:rPr lang="en-US" smtClean="0">
+                <a:latin typeface="Consolas" panose="020B0609020204030204" pitchFamily="49" charset="0"/>
+                <a:sym typeface="Symbol" panose="05050102010706020507" pitchFamily="18" charset="2"/>
+              </a:rPr>
+              <a:t> proxy(x </a:t>
+            </a:r>
+            <a:r>
+              <a:rPr lang="en-US" smtClean="0">
+                <a:solidFill>
+                  <a:srgbClr val="FF0000"/>
+                </a:solidFill>
+                <a:latin typeface="Consolas" panose="020B0609020204030204" pitchFamily="49" charset="0"/>
+                <a:sym typeface="Symbol" panose="05050102010706020507" pitchFamily="18" charset="2"/>
+              </a:rPr>
+              <a:t>##</a:t>
+            </a:r>
+            <a:r>
+              <a:rPr lang="en-US" smtClean="0">
+                <a:latin typeface="Consolas" panose="020B0609020204030204" pitchFamily="49" charset="0"/>
+                <a:sym typeface="Symbol" panose="05050102010706020507" pitchFamily="18" charset="2"/>
+              </a:rPr>
+              <a:t> y)</a:t>
+            </a:r>
+            <a:r>
+              <a:rPr lang="ru-RU" smtClean="0">
+                <a:latin typeface="Consolas" panose="020B0609020204030204" pitchFamily="49" charset="0"/>
+              </a:rPr>
+              <a:t/>
+            </a:r>
+            <a:br>
+              <a:rPr lang="ru-RU" smtClean="0">
+                <a:latin typeface="Consolas" panose="020B0609020204030204" pitchFamily="49" charset="0"/>
+              </a:rPr>
+            </a:br>
+            <a:r>
+              <a:rPr lang="en-US" smtClean="0">
+                <a:latin typeface="Consolas" panose="020B0609020204030204" pitchFamily="49" charset="0"/>
+              </a:rPr>
+              <a:t>#</a:t>
+            </a:r>
+            <a:r>
+              <a:rPr lang="en-US">
+                <a:latin typeface="Consolas" panose="020B0609020204030204" pitchFamily="49" charset="0"/>
+              </a:rPr>
+              <a:t>define join(c, d) </a:t>
+            </a:r>
+            <a:r>
+              <a:rPr lang="en-US" smtClean="0">
+                <a:latin typeface="Consolas" panose="020B0609020204030204" pitchFamily="49" charset="0"/>
+              </a:rPr>
+              <a:t>betw(c h_h </a:t>
+            </a:r>
+            <a:r>
+              <a:rPr lang="en-US">
+                <a:latin typeface="Consolas" panose="020B0609020204030204" pitchFamily="49" charset="0"/>
+              </a:rPr>
+              <a:t>d</a:t>
+            </a:r>
+            <a:r>
+              <a:rPr lang="en-US" smtClean="0">
+                <a:latin typeface="Consolas" panose="020B0609020204030204" pitchFamily="49" charset="0"/>
+              </a:rPr>
+              <a:t>)  </a:t>
+            </a:r>
+            <a:r>
+              <a:rPr lang="en-US" smtClean="0">
+                <a:latin typeface="Consolas" panose="020B0609020204030204" pitchFamily="49" charset="0"/>
+                <a:sym typeface="Symbol" panose="05050102010706020507" pitchFamily="18" charset="2"/>
+              </a:rPr>
+              <a:t></a:t>
+            </a:r>
+            <a:r>
+              <a:rPr lang="en-US">
+                <a:latin typeface="Consolas" panose="020B0609020204030204" pitchFamily="49" charset="0"/>
+                <a:sym typeface="Symbol" panose="05050102010706020507" pitchFamily="18" charset="2"/>
+              </a:rPr>
+              <a:t> </a:t>
+            </a:r>
+            <a:r>
+              <a:rPr lang="en-US" smtClean="0">
+                <a:latin typeface="Consolas" panose="020B0609020204030204" pitchFamily="49" charset="0"/>
+              </a:rPr>
+              <a:t>betw(x </a:t>
+            </a:r>
+            <a:r>
+              <a:rPr lang="en-US" smtClean="0">
+                <a:solidFill>
+                  <a:srgbClr val="FF0000"/>
+                </a:solidFill>
+                <a:latin typeface="Consolas" panose="020B0609020204030204" pitchFamily="49" charset="0"/>
+              </a:rPr>
+              <a:t>#</a:t>
+            </a:r>
+            <a:r>
+              <a:rPr lang="en-US" smtClean="0">
+                <a:latin typeface="Consolas" panose="020B0609020204030204" pitchFamily="49" charset="0"/>
+              </a:rPr>
+              <a:t> </a:t>
             </a:r>
             <a:r>
               <a:rPr lang="en-US" smtClean="0">
                 <a:solidFill>
                   <a:srgbClr val="0000FF"/>
                 </a:solidFill>
-              </a:rPr>
-              <a:t> </a:t>
-            </a:r>
-            <a:r>
-              <a:rPr lang="ru-RU" smtClean="0">
-                <a:solidFill>
-                  <a:srgbClr val="0000FF"/>
-                </a:solidFill>
-              </a:rPr>
-              <a:t>макрос </a:t>
-            </a:r>
-            <a:r>
-              <a:rPr lang="ru-RU" smtClean="0">
-                <a:solidFill>
-                  <a:srgbClr val="0000FF"/>
-                </a:solidFill>
-              </a:rPr>
-              <a:t>или </a:t>
-            </a:r>
-            <a:r>
-              <a:rPr lang="ru-RU" smtClean="0">
-                <a:solidFill>
-                  <a:srgbClr val="0000FF"/>
-                </a:solidFill>
-              </a:rPr>
-              <a:t>команда, </a:t>
-            </a:r>
-            <a:r>
-              <a:rPr lang="ru-RU" smtClean="0">
-                <a:solidFill>
-                  <a:srgbClr val="0000FF"/>
-                </a:solidFill>
-              </a:rPr>
-              <a:t>полученные в результате </a:t>
-            </a:r>
-            <a:r>
-              <a:rPr lang="ru-RU" smtClean="0">
-                <a:solidFill>
-                  <a:srgbClr val="0000FF"/>
-                </a:solidFill>
-              </a:rPr>
-              <a:t>раскрытия, </a:t>
-            </a:r>
-            <a:r>
-              <a:rPr lang="ru-RU" smtClean="0">
-                <a:solidFill>
-                  <a:srgbClr val="0000FF"/>
-                </a:solidFill>
-              </a:rPr>
-              <a:t>не раскрываются</a:t>
-            </a:r>
-          </a:p>
-          <a:p>
-            <a:pPr marL="45720" indent="0">
-              <a:buNone/>
-            </a:pPr>
-            <a:r>
-              <a:rPr lang="en-US" smtClean="0">
-                <a:latin typeface="Consolas" panose="020B0609020204030204" pitchFamily="49" charset="0"/>
-              </a:rPr>
-              <a:t>#</a:t>
-            </a:r>
-            <a:r>
-              <a:rPr lang="en-US">
-                <a:latin typeface="Consolas" panose="020B0609020204030204" pitchFamily="49" charset="0"/>
-              </a:rPr>
-              <a:t>define </a:t>
-            </a:r>
-            <a:r>
-              <a:rPr lang="en-US" smtClean="0">
-                <a:latin typeface="Consolas" panose="020B0609020204030204" pitchFamily="49" charset="0"/>
-              </a:rPr>
-              <a:t>h_h </a:t>
-            </a:r>
-            <a:r>
-              <a:rPr lang="en-US">
-                <a:latin typeface="Consolas" panose="020B0609020204030204" pitchFamily="49" charset="0"/>
-              </a:rPr>
-              <a:t># ## </a:t>
-            </a:r>
-            <a:r>
-              <a:rPr lang="en-US" smtClean="0">
-                <a:latin typeface="Consolas" panose="020B0609020204030204" pitchFamily="49" charset="0"/>
-              </a:rPr>
-              <a:t>#</a:t>
-            </a:r>
-            <a:r>
-              <a:rPr lang="ru-RU" smtClean="0">
-                <a:latin typeface="Consolas" panose="020B0609020204030204" pitchFamily="49" charset="0"/>
-              </a:rPr>
-              <a:t/>
-            </a:r>
-            <a:br>
-              <a:rPr lang="ru-RU" smtClean="0">
-                <a:latin typeface="Consolas" panose="020B0609020204030204" pitchFamily="49" charset="0"/>
-              </a:rPr>
-            </a:br>
-            <a:r>
-              <a:rPr lang="en-US" smtClean="0">
-                <a:latin typeface="Consolas" panose="020B0609020204030204" pitchFamily="49" charset="0"/>
-              </a:rPr>
-              <a:t>#</a:t>
-            </a:r>
-            <a:r>
-              <a:rPr lang="en-US">
-                <a:latin typeface="Consolas" panose="020B0609020204030204" pitchFamily="49" charset="0"/>
-              </a:rPr>
-              <a:t>define mkstr(a) # </a:t>
-            </a:r>
-            <a:r>
-              <a:rPr lang="en-US" smtClean="0">
-                <a:latin typeface="Consolas" panose="020B0609020204030204" pitchFamily="49" charset="0"/>
-              </a:rPr>
-              <a:t>a              </a:t>
-            </a:r>
-            <a:r>
-              <a:rPr lang="en-US" smtClean="0">
-                <a:latin typeface="Consolas" panose="020B0609020204030204" pitchFamily="49" charset="0"/>
-                <a:sym typeface="Symbol" panose="05050102010706020507" pitchFamily="18" charset="2"/>
-              </a:rPr>
-              <a:t> "x </a:t>
+                <a:latin typeface="Consolas" panose="020B0609020204030204" pitchFamily="49" charset="0"/>
+              </a:rPr>
+              <a:t>## </a:t>
             </a:r>
             <a:r>
               <a:rPr lang="en-US" smtClean="0">
@@ -9226,222 +9287,6 @@
                   <a:srgbClr val="FF0000"/>
                 </a:solidFill>
                 <a:latin typeface="Consolas" panose="020B0609020204030204" pitchFamily="49" charset="0"/>
-                <a:sym typeface="Symbol" panose="05050102010706020507" pitchFamily="18" charset="2"/>
-              </a:rPr>
-              <a:t>##</a:t>
-            </a:r>
-            <a:r>
-              <a:rPr lang="en-US" smtClean="0">
-                <a:latin typeface="Consolas" panose="020B0609020204030204" pitchFamily="49" charset="0"/>
-                <a:sym typeface="Symbol" panose="05050102010706020507" pitchFamily="18" charset="2"/>
-              </a:rPr>
-              <a:t> y"</a:t>
-            </a:r>
-            <a:r>
-              <a:rPr lang="ru-RU" smtClean="0">
-                <a:latin typeface="Consolas" panose="020B0609020204030204" pitchFamily="49" charset="0"/>
-              </a:rPr>
-              <a:t/>
-            </a:r>
-            <a:br>
-              <a:rPr lang="ru-RU" smtClean="0">
-                <a:latin typeface="Consolas" panose="020B0609020204030204" pitchFamily="49" charset="0"/>
-              </a:rPr>
-            </a:br>
-            <a:r>
-              <a:rPr lang="en-US" smtClean="0">
-                <a:latin typeface="Consolas" panose="020B0609020204030204" pitchFamily="49" charset="0"/>
-              </a:rPr>
-              <a:t>#define proxy(a) mkstr(a)</a:t>
-            </a:r>
-            <a:r>
-              <a:rPr lang="ru-RU" smtClean="0">
-                <a:latin typeface="Consolas" panose="020B0609020204030204" pitchFamily="49" charset="0"/>
-              </a:rPr>
-              <a:t>         </a:t>
-            </a:r>
-            <a:r>
-              <a:rPr lang="en-US" smtClean="0">
-                <a:latin typeface="Consolas" panose="020B0609020204030204" pitchFamily="49" charset="0"/>
-                <a:sym typeface="Symbol" panose="05050102010706020507" pitchFamily="18" charset="2"/>
-              </a:rPr>
-              <a:t> </a:t>
-            </a:r>
-            <a:r>
-              <a:rPr lang="en-US" smtClean="0">
-                <a:latin typeface="Consolas" panose="020B0609020204030204" pitchFamily="49" charset="0"/>
-                <a:sym typeface="Symbol" panose="05050102010706020507" pitchFamily="18" charset="2"/>
-              </a:rPr>
-              <a:t>mkstr(x </a:t>
-            </a:r>
-            <a:r>
-              <a:rPr lang="en-US" smtClean="0">
-                <a:solidFill>
-                  <a:srgbClr val="FF0000"/>
-                </a:solidFill>
-                <a:latin typeface="Consolas" panose="020B0609020204030204" pitchFamily="49" charset="0"/>
-                <a:sym typeface="Symbol" panose="05050102010706020507" pitchFamily="18" charset="2"/>
-              </a:rPr>
-              <a:t>##</a:t>
-            </a:r>
-            <a:r>
-              <a:rPr lang="en-US" smtClean="0">
-                <a:latin typeface="Consolas" panose="020B0609020204030204" pitchFamily="49" charset="0"/>
-                <a:sym typeface="Symbol" panose="05050102010706020507" pitchFamily="18" charset="2"/>
-              </a:rPr>
-              <a:t> y</a:t>
-            </a:r>
-            <a:r>
-              <a:rPr lang="ru-RU" smtClean="0">
-                <a:latin typeface="Consolas" panose="020B0609020204030204" pitchFamily="49" charset="0"/>
-                <a:sym typeface="Symbol" panose="05050102010706020507" pitchFamily="18" charset="2"/>
-              </a:rPr>
-              <a:t>)</a:t>
-            </a:r>
-            <a:r>
-              <a:rPr lang="en-US" smtClean="0">
-                <a:latin typeface="Consolas" panose="020B0609020204030204" pitchFamily="49" charset="0"/>
-              </a:rPr>
-              <a:t/>
-            </a:r>
-            <a:br>
-              <a:rPr lang="en-US" smtClean="0">
-                <a:latin typeface="Consolas" panose="020B0609020204030204" pitchFamily="49" charset="0"/>
-              </a:rPr>
-            </a:br>
-            <a:r>
-              <a:rPr lang="en-US" smtClean="0">
-                <a:latin typeface="Consolas" panose="020B0609020204030204" pitchFamily="49" charset="0"/>
-              </a:rPr>
-              <a:t>#define betw(a</a:t>
-            </a:r>
-            <a:r>
-              <a:rPr lang="en-US">
-                <a:latin typeface="Consolas" panose="020B0609020204030204" pitchFamily="49" charset="0"/>
-              </a:rPr>
-              <a:t>) </a:t>
-            </a:r>
-            <a:r>
-              <a:rPr lang="en-US" smtClean="0">
-                <a:latin typeface="Consolas" panose="020B0609020204030204" pitchFamily="49" charset="0"/>
-              </a:rPr>
-              <a:t>proxy(a)          </a:t>
-            </a:r>
-            <a:r>
-              <a:rPr lang="en-US" smtClean="0">
-                <a:latin typeface="Consolas" panose="020B0609020204030204" pitchFamily="49" charset="0"/>
-                <a:sym typeface="Symbol" panose="05050102010706020507" pitchFamily="18" charset="2"/>
-              </a:rPr>
-              <a:t> proxy(x </a:t>
-            </a:r>
-            <a:r>
-              <a:rPr lang="en-US" smtClean="0">
-                <a:solidFill>
-                  <a:srgbClr val="FF0000"/>
-                </a:solidFill>
-                <a:latin typeface="Consolas" panose="020B0609020204030204" pitchFamily="49" charset="0"/>
-                <a:sym typeface="Symbol" panose="05050102010706020507" pitchFamily="18" charset="2"/>
-              </a:rPr>
-              <a:t>##</a:t>
-            </a:r>
-            <a:r>
-              <a:rPr lang="en-US" smtClean="0">
-                <a:latin typeface="Consolas" panose="020B0609020204030204" pitchFamily="49" charset="0"/>
-                <a:sym typeface="Symbol" panose="05050102010706020507" pitchFamily="18" charset="2"/>
-              </a:rPr>
-              <a:t> y)</a:t>
-            </a:r>
-            <a:r>
-              <a:rPr lang="ru-RU" smtClean="0">
-                <a:latin typeface="Consolas" panose="020B0609020204030204" pitchFamily="49" charset="0"/>
-              </a:rPr>
-              <a:t/>
-            </a:r>
-            <a:br>
-              <a:rPr lang="ru-RU" smtClean="0">
-                <a:latin typeface="Consolas" panose="020B0609020204030204" pitchFamily="49" charset="0"/>
-              </a:rPr>
-            </a:br>
-            <a:r>
-              <a:rPr lang="en-US" smtClean="0">
-                <a:latin typeface="Consolas" panose="020B0609020204030204" pitchFamily="49" charset="0"/>
-              </a:rPr>
-              <a:t>#</a:t>
-            </a:r>
-            <a:r>
-              <a:rPr lang="en-US">
-                <a:latin typeface="Consolas" panose="020B0609020204030204" pitchFamily="49" charset="0"/>
-              </a:rPr>
-              <a:t>define join(c, d) </a:t>
-            </a:r>
-            <a:r>
-              <a:rPr lang="en-US" smtClean="0">
-                <a:latin typeface="Consolas" panose="020B0609020204030204" pitchFamily="49" charset="0"/>
-              </a:rPr>
-              <a:t>betw(c h_h </a:t>
-            </a:r>
-            <a:r>
-              <a:rPr lang="en-US">
-                <a:latin typeface="Consolas" panose="020B0609020204030204" pitchFamily="49" charset="0"/>
-              </a:rPr>
-              <a:t>d</a:t>
-            </a:r>
-            <a:r>
-              <a:rPr lang="en-US" smtClean="0">
-                <a:latin typeface="Consolas" panose="020B0609020204030204" pitchFamily="49" charset="0"/>
-              </a:rPr>
-              <a:t>)  </a:t>
-            </a:r>
-            <a:r>
-              <a:rPr lang="en-US" smtClean="0">
-                <a:latin typeface="Consolas" panose="020B0609020204030204" pitchFamily="49" charset="0"/>
-                <a:sym typeface="Symbol" panose="05050102010706020507" pitchFamily="18" charset="2"/>
-              </a:rPr>
-              <a:t></a:t>
-            </a:r>
-            <a:r>
-              <a:rPr lang="en-US">
-                <a:latin typeface="Consolas" panose="020B0609020204030204" pitchFamily="49" charset="0"/>
-                <a:sym typeface="Symbol" panose="05050102010706020507" pitchFamily="18" charset="2"/>
-              </a:rPr>
-              <a:t> </a:t>
-            </a:r>
-            <a:r>
-              <a:rPr lang="en-US" smtClean="0">
-                <a:latin typeface="Consolas" panose="020B0609020204030204" pitchFamily="49" charset="0"/>
-              </a:rPr>
-              <a:t>betw(x </a:t>
-            </a:r>
-            <a:r>
-              <a:rPr lang="en-US" smtClean="0">
-                <a:solidFill>
-                  <a:srgbClr val="FF0000"/>
-                </a:solidFill>
-                <a:latin typeface="Consolas" panose="020B0609020204030204" pitchFamily="49" charset="0"/>
-              </a:rPr>
-              <a:t>#</a:t>
-            </a:r>
-            <a:r>
-              <a:rPr lang="en-US" smtClean="0">
-                <a:latin typeface="Consolas" panose="020B0609020204030204" pitchFamily="49" charset="0"/>
-              </a:rPr>
-              <a:t> </a:t>
-            </a:r>
-            <a:r>
-              <a:rPr lang="en-US" smtClean="0">
-                <a:solidFill>
-                  <a:srgbClr val="0000FF"/>
-                </a:solidFill>
-                <a:latin typeface="Consolas" panose="020B0609020204030204" pitchFamily="49" charset="0"/>
-              </a:rPr>
-              <a:t>## </a:t>
-            </a:r>
-            <a:r>
-              <a:rPr lang="en-US" smtClean="0">
-                <a:solidFill>
-                  <a:srgbClr val="FF0000"/>
-                </a:solidFill>
-                <a:latin typeface="Consolas" panose="020B0609020204030204" pitchFamily="49" charset="0"/>
               </a:rPr>
               <a:t>#</a:t>
             </a:r>
@@ -9537,9 +9382,6 @@
               </a:rPr>
               <a:t>proxy</a:t>
             </a:r>
-            <a:endParaRPr lang="en-US" smtClean="0">
-              <a:latin typeface="Consolas" panose="020B0609020204030204" pitchFamily="49" charset="0"/>
-            </a:endParaRPr>
           </a:p>
         </p:txBody>
       </p:sp>
@@ -9905,13 +9747,7 @@
               <a:rPr lang="en-US" smtClean="0">
                 <a:latin typeface="Consolas" panose="020B0609020204030204" pitchFamily="49" charset="0"/>
               </a:rPr>
-              <a:t>#</a:t>
-            </a:r>
-            <a:r>
-              <a:rPr lang="en-US" smtClean="0">
-                <a:latin typeface="Consolas" panose="020B0609020204030204" pitchFamily="49" charset="0"/>
-              </a:rPr>
-              <a:t>if defined(ENABLE_CHECKS)</a:t>
+              <a:t>#if defined(ENABLE_CHECKS)</a:t>
             </a:r>
           </a:p>
           <a:p>
@@ -10214,13 +10050,7 @@
               <a:rPr lang="en-US" smtClean="0">
                 <a:latin typeface="Consolas" panose="020B0609020204030204" pitchFamily="49" charset="0"/>
               </a:rPr>
-              <a:t>if VARIABLE is </a:t>
-            </a:r>
-            <a:r>
-              <a:rPr lang="en-US" smtClean="0">
-                <a:latin typeface="Consolas" panose="020B0609020204030204" pitchFamily="49" charset="0"/>
-              </a:rPr>
-              <a:t>3</a:t>
+              <a:t>if VARIABLE is 3</a:t>
             </a:r>
             <a:endParaRPr lang="ru-RU" smtClean="0">
               <a:latin typeface="Consolas" panose="020B0609020204030204" pitchFamily="49" charset="0"/>
@@ -10275,15 +10105,7 @@
           <a:p>
             <a:r>
               <a:rPr lang="ru-RU" smtClean="0"/>
-              <a:t>Ещё раз о</a:t>
-            </a:r>
-            <a:r>
-              <a:rPr lang="ru-RU" smtClean="0"/>
-              <a:t> </a:t>
-            </a:r>
-            <a:r>
-              <a:rPr lang="ru-RU" smtClean="0"/>
-              <a:t>трансляции программы</a:t>
+              <a:t>Ещё раз о трансляции программы</a:t>
             </a:r>
             <a:endParaRPr lang="en-US"/>
           </a:p>
@@ -13416,13 +13238,7 @@
               <a:rPr lang="en-US">
                 <a:latin typeface="Consolas" panose="020B0609020204030204" pitchFamily="49" charset="0"/>
               </a:rPr>
-              <a:t>x); </a:t>
-            </a:r>
-            <a:r>
-              <a:rPr lang="en-US">
-                <a:latin typeface="Consolas" panose="020B0609020204030204" pitchFamily="49" charset="0"/>
-              </a:rPr>
-              <a:t>// </a:t>
+              <a:t>x); // </a:t>
             </a:r>
             <a:r>
               <a:rPr lang="en-US" smtClean="0">
@@ -13802,11 +13618,7 @@
           <a:p>
             <a:r>
               <a:rPr lang="ru-RU"/>
-              <a:t>Точно </a:t>
-            </a:r>
-            <a:r>
-              <a:rPr lang="ru-RU"/>
-              <a:t>подходящая </a:t>
+              <a:t>Точно подходящая </a:t>
             </a:r>
             <a:r>
               <a:rPr lang="ru-RU" smtClean="0"/>
@@ -13903,13 +13715,7 @@
               <a:rPr lang="en-US">
                 <a:latin typeface="Consolas" pitchFamily="49"/>
               </a:rPr>
-              <a:t>max(7, 42</a:t>
-            </a:r>
-            <a:r>
-              <a:rPr lang="en-US">
-                <a:latin typeface="Consolas" pitchFamily="49"/>
-              </a:rPr>
-              <a:t>);    </a:t>
+              <a:t>max(7, 42);    </a:t>
             </a:r>
             <a:r>
               <a:rPr lang="en-US" smtClean="0">
@@ -13939,13 +13745,7 @@
               <a:rPr lang="en-US">
                 <a:latin typeface="Consolas" pitchFamily="49"/>
               </a:rPr>
-              <a:t>max(7.0, 42.0</a:t>
-            </a:r>
-            <a:r>
-              <a:rPr lang="en-US">
-                <a:latin typeface="Consolas" pitchFamily="49"/>
-              </a:rPr>
-              <a:t>);   </a:t>
+              <a:t>max(7.0, 42.0);   </a:t>
             </a:r>
             <a:r>
               <a:rPr lang="en-US" smtClean="0">
@@ -13981,13 +13781,7 @@
               <a:rPr lang="en-US">
                 <a:latin typeface="Consolas" pitchFamily="49"/>
               </a:rPr>
-              <a:t>max&lt;int&gt;(7, 42</a:t>
-            </a:r>
-            <a:r>
-              <a:rPr lang="en-US">
-                <a:latin typeface="Consolas" pitchFamily="49"/>
-              </a:rPr>
-              <a:t>);  </a:t>
+              <a:t>max&lt;int&gt;(7, 42);  </a:t>
             </a:r>
             <a:r>
               <a:rPr lang="en-US" smtClean="0">
@@ -14023,67 +13817,49 @@
               <a:rPr lang="en-US">
                 <a:latin typeface="Consolas" pitchFamily="49"/>
               </a:rPr>
-              <a:t>max&lt;&gt;(7, 42</a:t>
+              <a:t>max&lt;&gt;(7, 42); </a:t>
+            </a:r>
+            <a:r>
+              <a:rPr lang="en-US" smtClean="0">
+                <a:latin typeface="Consolas" pitchFamily="49"/>
+              </a:rPr>
+              <a:t>    // </a:t>
+            </a:r>
+            <a:r>
+              <a:rPr lang="en-US">
+                <a:latin typeface="Consolas" panose="020B0609020204030204" pitchFamily="49" charset="0"/>
+                <a:sym typeface="Symbol" panose="05050102010706020507" pitchFamily="18" charset="2"/>
+              </a:rPr>
+              <a:t> </a:t>
             </a:r>
             <a:r>
               <a:rPr lang="en-US">
                 <a:latin typeface="Consolas" pitchFamily="49"/>
               </a:rPr>
-              <a:t>); </a:t>
+              <a:t>2&lt;int&gt; </a:t>
             </a:r>
             <a:r>
               <a:rPr lang="en-US" smtClean="0">
                 <a:latin typeface="Consolas" pitchFamily="49"/>
               </a:rPr>
-              <a:t>    // </a:t>
-            </a:r>
-            <a:r>
-              <a:rPr lang="en-US">
-                <a:latin typeface="Consolas" panose="020B0609020204030204" pitchFamily="49" charset="0"/>
-                <a:sym typeface="Symbol" panose="05050102010706020507" pitchFamily="18" charset="2"/>
-              </a:rPr>
-              <a:t> </a:t>
+              <a:t/>
+            </a:r>
+            <a:br>
+              <a:rPr lang="en-US" smtClean="0">
+                <a:latin typeface="Consolas" pitchFamily="49"/>
+              </a:rPr>
+            </a:br>
+            <a:r>
+              <a:rPr lang="en-US" smtClean="0">
+                <a:latin typeface="Consolas" pitchFamily="49"/>
+              </a:rPr>
+              <a:t>max</a:t>
             </a:r>
             <a:r>
               <a:rPr lang="en-US">
                 <a:latin typeface="Consolas" pitchFamily="49"/>
               </a:rPr>
-              <a:t>2&lt;int</a:t>
-            </a:r>
-            <a:r>
-              <a:rPr lang="en-US">
-                <a:latin typeface="Consolas" pitchFamily="49"/>
-              </a:rPr>
-              <a:t>&gt; </a:t>
-            </a:r>
-            <a:r>
-              <a:rPr lang="en-US" smtClean="0">
-                <a:latin typeface="Consolas" pitchFamily="49"/>
-              </a:rPr>
-              <a:t/>
-            </a:r>
-            <a:br>
-              <a:rPr lang="en-US" smtClean="0">
-                <a:latin typeface="Consolas" pitchFamily="49"/>
-              </a:rPr>
-            </a:br>
-            <a:r>
-              <a:rPr lang="en-US" smtClean="0">
-                <a:latin typeface="Consolas" pitchFamily="49"/>
-              </a:rPr>
-              <a:t>max</a:t>
-            </a:r>
-            <a:r>
-              <a:rPr lang="en-US">
-                <a:latin typeface="Consolas" pitchFamily="49"/>
-              </a:rPr>
-              <a:t>('a', 42.7</a:t>
-            </a:r>
-            <a:r>
-              <a:rPr lang="en-US">
-                <a:latin typeface="Consolas" pitchFamily="49"/>
-              </a:rPr>
-              <a:t>); </a:t>
+              <a:t>('a', 42.7); </a:t>
             </a:r>
             <a:r>
               <a:rPr lang="en-US" smtClean="0">
@@ -14302,13 +14078,7 @@
               <a:rPr lang="en-US">
                 <a:latin typeface="Consolas" pitchFamily="49"/>
               </a:rPr>
-              <a:t>f(a</a:t>
-            </a:r>
-            <a:r>
-              <a:rPr lang="en-US">
-                <a:latin typeface="Consolas" pitchFamily="49"/>
-              </a:rPr>
-              <a:t>); </a:t>
+              <a:t>f(a); </a:t>
             </a:r>
             <a:r>
               <a:rPr lang="en-US" smtClean="0">
@@ -14345,33 +14115,14 @@
               <a:rPr lang="en-US">
                 <a:latin typeface="Consolas" pitchFamily="49"/>
               </a:rPr>
-              <a:t>f&lt;int**&gt;(a</a:t>
+              <a:t>f&lt;int**&gt;(a); // </a:t>
             </a:r>
             <a:r>
               <a:rPr lang="en-US">
-                <a:latin typeface="Consolas" pitchFamily="49"/>
-              </a:rPr>
-              <a:t>); </a:t>
-            </a:r>
-            <a:r>
-              <a:rPr lang="en-US">
-                <a:latin typeface="Consolas" pitchFamily="49"/>
-              </a:rPr>
-              <a:t>// </a:t>
-            </a:r>
-            <a:r>
-              <a:rPr lang="en-US">
                 <a:latin typeface="Consolas" panose="020B0609020204030204" pitchFamily="49" charset="0"/>
                 <a:sym typeface="Symbol" panose="05050102010706020507" pitchFamily="18" charset="2"/>
               </a:rPr>
-              <a:t> </a:t>
-            </a:r>
-            <a:r>
-              <a:rPr lang="en-US">
-                <a:latin typeface="Consolas" panose="020B0609020204030204" pitchFamily="49" charset="0"/>
-                <a:sym typeface="Symbol" panose="05050102010706020507" pitchFamily="18" charset="2"/>
-              </a:rPr>
-              <a:t>2</a:t>
+              <a:t> 2</a:t>
             </a:r>
             <a:endParaRPr lang="en-US"/>
           </a:p>
@@ -14453,13 +14204,7 @@
               <a:rPr lang="fr-FR">
                 <a:latin typeface="Consolas" pitchFamily="49"/>
               </a:rPr>
-              <a:t>template &lt;typename T1, typename T2&gt; </a:t>
-            </a:r>
-            <a:r>
-              <a:rPr lang="fr-FR">
-                <a:latin typeface="Consolas" pitchFamily="49"/>
-              </a:rPr>
-              <a:t>void </a:t>
+              <a:t>template &lt;typename T1, typename T2&gt; void </a:t>
             </a:r>
             <a:r>
               <a:rPr lang="fr-FR" smtClean="0">
@@ -14504,43 +14249,31 @@
               <a:rPr lang="fr-FR">
                 <a:latin typeface="Consolas" pitchFamily="49"/>
               </a:rPr>
-              <a:t>template &lt;typename T&gt; </a:t>
+              <a:t>template &lt;typename T&gt; void </a:t>
+            </a:r>
+            <a:r>
+              <a:rPr lang="fr-FR" smtClean="0">
+                <a:latin typeface="Consolas" pitchFamily="49"/>
+              </a:rPr>
+              <a:t>f</a:t>
+            </a:r>
+            <a:r>
+              <a:rPr lang="ru-RU" smtClean="0">
+                <a:latin typeface="Consolas" pitchFamily="49"/>
+              </a:rPr>
+              <a:t> </a:t>
+            </a:r>
+            <a:r>
+              <a:rPr lang="fr-FR" smtClean="0">
+                <a:latin typeface="Consolas" pitchFamily="49"/>
+              </a:rPr>
+              <a:t>(T</a:t>
             </a:r>
             <a:r>
               <a:rPr lang="fr-FR">
                 <a:latin typeface="Consolas" pitchFamily="49"/>
               </a:rPr>
-              <a:t>void </a:t>
-            </a:r>
-            <a:r>
-              <a:rPr lang="fr-FR" smtClean="0">
-                <a:latin typeface="Consolas" pitchFamily="49"/>
-              </a:rPr>
-              <a:t>f</a:t>
-            </a:r>
-            <a:r>
-              <a:rPr lang="ru-RU" smtClean="0">
-                <a:latin typeface="Consolas" pitchFamily="49"/>
-              </a:rPr>
-              <a:t> </a:t>
-            </a:r>
-            <a:r>
-              <a:rPr lang="fr-FR" smtClean="0">
-                <a:latin typeface="Consolas" pitchFamily="49"/>
-              </a:rPr>
-              <a:t>(T</a:t>
-            </a:r>
-            <a:r>
-              <a:rPr lang="fr-FR">
-                <a:latin typeface="Consolas" pitchFamily="49"/>
-              </a:rPr>
-              <a:t>, </a:t>
-            </a:r>
-            <a:r>
-              <a:rPr lang="fr-FR">
-                <a:latin typeface="Consolas" pitchFamily="49"/>
-              </a:rPr>
-              <a:t>T</a:t>
+              <a:t>, T</a:t>
             </a:r>
             <a:r>
               <a:rPr lang="fr-FR" smtClean="0">
@@ -14565,12 +14298,6 @@
               </a:rPr>
               <a:t>double t, s;</a:t>
             </a:r>
-            <a:r>
-              <a:rPr lang="en-US">
-                <a:latin typeface="Consolas" pitchFamily="49"/>
-              </a:rPr>
-              <a:t/>
-            </a:r>
             <a:br>
               <a:rPr lang="en-US">
                 <a:latin typeface="Consolas" pitchFamily="49"/>
@@ -14598,19 +14325,7 @@
               <a:rPr lang="en-US">
                 <a:latin typeface="Consolas" pitchFamily="49"/>
               </a:rPr>
-              <a:t>t, &amp;s</a:t>
-            </a:r>
-            <a:r>
-              <a:rPr lang="en-US">
-                <a:latin typeface="Consolas" pitchFamily="49"/>
-              </a:rPr>
-              <a:t>); </a:t>
-            </a:r>
-            <a:r>
-              <a:rPr lang="en-US">
-                <a:latin typeface="Consolas" pitchFamily="49"/>
-              </a:rPr>
-              <a:t>// </a:t>
+              <a:t>t, &amp;s); // </a:t>
             </a:r>
             <a:r>
               <a:rPr lang="en-US">
@@ -14646,13 +14361,7 @@
               <a:rPr lang="fr-FR">
                 <a:latin typeface="Consolas" pitchFamily="49"/>
               </a:rPr>
-              <a:t>template &lt;typename T&gt; </a:t>
-            </a:r>
-            <a:r>
-              <a:rPr lang="fr-FR">
-                <a:latin typeface="Consolas" pitchFamily="49"/>
-              </a:rPr>
-              <a:t>void </a:t>
+              <a:t>template &lt;typename T&gt; void </a:t>
             </a:r>
             <a:r>
               <a:rPr lang="fr-FR" smtClean="0">
@@ -14699,43 +14408,31 @@
               <a:rPr lang="fr-FR">
                 <a:latin typeface="Consolas" pitchFamily="49"/>
               </a:rPr>
-              <a:t>template &lt;typename T1 typename T2&gt; </a:t>
+              <a:t>template &lt;typename T1 typename T2&gt; void </a:t>
+            </a:r>
+            <a:r>
+              <a:rPr lang="fr-FR" smtClean="0">
+                <a:latin typeface="Consolas" pitchFamily="49"/>
+              </a:rPr>
+              <a:t>g</a:t>
+            </a:r>
+            <a:r>
+              <a:rPr lang="ru-RU" smtClean="0">
+                <a:latin typeface="Consolas" pitchFamily="49"/>
+              </a:rPr>
+              <a:t> </a:t>
+            </a:r>
+            <a:r>
+              <a:rPr lang="fr-FR" smtClean="0">
+                <a:latin typeface="Consolas" pitchFamily="49"/>
+              </a:rPr>
+              <a:t>(T1</a:t>
             </a:r>
             <a:r>
               <a:rPr lang="fr-FR">
                 <a:latin typeface="Consolas" pitchFamily="49"/>
               </a:rPr>
-              <a:t>void </a:t>
-            </a:r>
-            <a:r>
-              <a:rPr lang="fr-FR" smtClean="0">
-                <a:latin typeface="Consolas" pitchFamily="49"/>
-              </a:rPr>
-              <a:t>g</a:t>
-            </a:r>
-            <a:r>
-              <a:rPr lang="ru-RU" smtClean="0">
-                <a:latin typeface="Consolas" pitchFamily="49"/>
-              </a:rPr>
-              <a:t> </a:t>
-            </a:r>
-            <a:r>
-              <a:rPr lang="fr-FR" smtClean="0">
-                <a:latin typeface="Consolas" pitchFamily="49"/>
-              </a:rPr>
-              <a:t>(T1</a:t>
-            </a:r>
-            <a:r>
-              <a:rPr lang="fr-FR">
-                <a:latin typeface="Consolas" pitchFamily="49"/>
-              </a:rPr>
-              <a:t>, </a:t>
-            </a:r>
-            <a:r>
-              <a:rPr lang="fr-FR">
-                <a:latin typeface="Consolas" pitchFamily="49"/>
-              </a:rPr>
-              <a:t>T2</a:t>
+              <a:t>, T2</a:t>
             </a:r>
             <a:r>
               <a:rPr lang="fr-FR" smtClean="0">
@@ -14758,43 +14455,31 @@
               <a:rPr lang="fr-FR">
                 <a:latin typeface="Consolas" pitchFamily="49"/>
               </a:rPr>
-              <a:t>template &lt;typename T1 typename T2&gt; </a:t>
+              <a:t>template &lt;typename T1 typename T2&gt; void </a:t>
+            </a:r>
+            <a:r>
+              <a:rPr lang="fr-FR" smtClean="0">
+                <a:latin typeface="Consolas" pitchFamily="49"/>
+              </a:rPr>
+              <a:t>g</a:t>
+            </a:r>
+            <a:r>
+              <a:rPr lang="ru-RU" smtClean="0">
+                <a:latin typeface="Consolas" pitchFamily="49"/>
+              </a:rPr>
+              <a:t> </a:t>
+            </a:r>
+            <a:r>
+              <a:rPr lang="fr-FR" smtClean="0">
+                <a:latin typeface="Consolas" pitchFamily="49"/>
+              </a:rPr>
+              <a:t>(T1</a:t>
             </a:r>
             <a:r>
               <a:rPr lang="fr-FR">
                 <a:latin typeface="Consolas" pitchFamily="49"/>
               </a:rPr>
-              <a:t>void </a:t>
-            </a:r>
-            <a:r>
-              <a:rPr lang="fr-FR" smtClean="0">
-                <a:latin typeface="Consolas" pitchFamily="49"/>
-              </a:rPr>
-              <a:t>g</a:t>
-            </a:r>
-            <a:r>
-              <a:rPr lang="ru-RU" smtClean="0">
-                <a:latin typeface="Consolas" pitchFamily="49"/>
-              </a:rPr>
-              <a:t> </a:t>
-            </a:r>
-            <a:r>
-              <a:rPr lang="fr-FR" smtClean="0">
-                <a:latin typeface="Consolas" pitchFamily="49"/>
-              </a:rPr>
-              <a:t>(T1</a:t>
-            </a:r>
-            <a:r>
-              <a:rPr lang="fr-FR">
-                <a:latin typeface="Consolas" pitchFamily="49"/>
-              </a:rPr>
-              <a:t>*, </a:t>
-            </a:r>
-            <a:r>
-              <a:rPr lang="fr-FR">
-                <a:latin typeface="Consolas" pitchFamily="49"/>
-              </a:rPr>
-              <a:t>T2</a:t>
+              <a:t>*, T2</a:t>
             </a:r>
             <a:r>
               <a:rPr lang="fr-FR" smtClean="0">
@@ -15508,6 +15193,238 @@
           <a:lstStyle/>
           <a:p>
             <a:r>
+              <a:rPr lang="ru-RU" smtClean="0"/>
+              <a:t>Проблема-тизер</a:t>
+            </a:r>
+            <a:endParaRPr lang="en-US"/>
+          </a:p>
+        </p:txBody>
+      </p:sp>
+      <p:sp>
+        <p:nvSpPr>
+          <p:cNvPr id="3" name="Content Placeholder 2"/>
+          <p:cNvSpPr>
+            <a:spLocks noGrp="1"/>
+          </p:cNvSpPr>
+          <p:nvPr>
+            <p:ph idx="1"/>
+          </p:nvPr>
+        </p:nvSpPr>
+        <p:spPr/>
+        <p:txBody>
+          <a:bodyPr/>
+          <a:lstStyle/>
+          <a:p>
+            <a:r>
+              <a:rPr lang="ru-RU" smtClean="0"/>
+              <a:t>До следующей лекции можно подумать над </a:t>
+            </a:r>
+            <a:r>
+              <a:rPr lang="ru-RU" smtClean="0">
+                <a:solidFill>
+                  <a:srgbClr val="0000FF"/>
+                </a:solidFill>
+              </a:rPr>
+              <a:t>проблемой гетерогенного минимума</a:t>
+            </a:r>
+            <a:r>
+              <a:rPr lang="ru-RU" smtClean="0"/>
+              <a:t>.</a:t>
+            </a:r>
+          </a:p>
+          <a:p>
+            <a:pPr marL="45720" indent="0">
+              <a:buNone/>
+            </a:pPr>
+            <a:r>
+              <a:rPr lang="fr-FR">
+                <a:latin typeface="Consolas" pitchFamily="49"/>
+              </a:rPr>
+              <a:t>template &lt;</a:t>
+            </a:r>
+            <a:r>
+              <a:rPr lang="fr-FR">
+                <a:latin typeface="Consolas" pitchFamily="49"/>
+              </a:rPr>
+              <a:t>typename </a:t>
+            </a:r>
+            <a:r>
+              <a:rPr lang="fr-FR" smtClean="0">
+                <a:latin typeface="Consolas" pitchFamily="49"/>
+              </a:rPr>
+              <a:t>T, </a:t>
+            </a:r>
+            <a:r>
+              <a:rPr lang="fr-FR">
+                <a:latin typeface="Consolas" pitchFamily="49"/>
+              </a:rPr>
+              <a:t>typename </a:t>
+            </a:r>
+            <a:r>
+              <a:rPr lang="en-US" smtClean="0">
+                <a:latin typeface="Consolas" pitchFamily="49"/>
+              </a:rPr>
+              <a:t>U</a:t>
+            </a:r>
+            <a:r>
+              <a:rPr lang="fr-FR" smtClean="0">
+                <a:latin typeface="Consolas" pitchFamily="49"/>
+              </a:rPr>
+              <a:t>&gt; </a:t>
+            </a:r>
+            <a:r>
+              <a:rPr lang="ru-RU">
+                <a:latin typeface="Consolas" pitchFamily="49"/>
+              </a:rPr>
+              <a:t/>
+            </a:r>
+            <a:br>
+              <a:rPr lang="ru-RU">
+                <a:latin typeface="Consolas" pitchFamily="49"/>
+              </a:rPr>
+            </a:br>
+            <a:r>
+              <a:rPr lang="fr-FR" smtClean="0">
+                <a:solidFill>
+                  <a:srgbClr val="FF0000"/>
+                </a:solidFill>
+                <a:latin typeface="Consolas" pitchFamily="49"/>
+              </a:rPr>
+              <a:t>???</a:t>
+            </a:r>
+            <a:r>
+              <a:rPr lang="fr-FR" smtClean="0">
+                <a:latin typeface="Consolas" pitchFamily="49"/>
+              </a:rPr>
+              <a:t> min</a:t>
+            </a:r>
+            <a:r>
+              <a:rPr lang="ru-RU" smtClean="0">
+                <a:latin typeface="Consolas" pitchFamily="49"/>
+              </a:rPr>
+              <a:t> </a:t>
+            </a:r>
+            <a:r>
+              <a:rPr lang="fr-FR">
+                <a:latin typeface="Consolas" pitchFamily="49"/>
+              </a:rPr>
+              <a:t>(</a:t>
+            </a:r>
+            <a:r>
+              <a:rPr lang="fr-FR" smtClean="0">
+                <a:latin typeface="Consolas" pitchFamily="49"/>
+              </a:rPr>
+              <a:t>T x,</a:t>
+            </a:r>
+            <a:r>
+              <a:rPr lang="ru-RU" smtClean="0">
+                <a:latin typeface="Consolas" pitchFamily="49"/>
+              </a:rPr>
+              <a:t> </a:t>
+            </a:r>
+            <a:r>
+              <a:rPr lang="fr-FR" smtClean="0">
+                <a:latin typeface="Consolas" pitchFamily="49"/>
+              </a:rPr>
+              <a:t>U y) {</a:t>
+            </a:r>
+            <a:r>
+              <a:rPr lang="ru-RU">
+                <a:latin typeface="Consolas" pitchFamily="49"/>
+              </a:rPr>
+              <a:t/>
+            </a:r>
+            <a:br>
+              <a:rPr lang="ru-RU">
+                <a:latin typeface="Consolas" pitchFamily="49"/>
+              </a:rPr>
+            </a:br>
+            <a:r>
+              <a:rPr lang="fr-FR" smtClean="0">
+                <a:latin typeface="Consolas" pitchFamily="49"/>
+              </a:rPr>
+              <a:t>  return (x &lt;= y) ? x : y;</a:t>
+            </a:r>
+            <a:r>
+              <a:rPr lang="ru-RU">
+                <a:latin typeface="Consolas" pitchFamily="49"/>
+              </a:rPr>
+              <a:t/>
+            </a:r>
+            <a:br>
+              <a:rPr lang="ru-RU">
+                <a:latin typeface="Consolas" pitchFamily="49"/>
+              </a:rPr>
+            </a:br>
+            <a:r>
+              <a:rPr lang="fr-FR" smtClean="0">
+                <a:latin typeface="Consolas" pitchFamily="49"/>
+              </a:rPr>
+              <a:t>}</a:t>
+            </a:r>
+            <a:endParaRPr lang="ru-RU" smtClean="0"/>
+          </a:p>
+          <a:p>
+            <a:r>
+              <a:rPr lang="ru-RU" smtClean="0"/>
+              <a:t>Какой бы вы здесь использовали возвращаемый тип?</a:t>
+            </a:r>
+          </a:p>
+          <a:p>
+            <a:r>
+              <a:rPr lang="ru-RU" smtClean="0"/>
+              <a:t>Не надо обманываться простой формулировкой этой проблемы. Она сложна и решений у неё много.</a:t>
+            </a:r>
+            <a:endParaRPr lang="en-US"/>
+          </a:p>
+        </p:txBody>
+      </p:sp>
+    </p:spTree>
+    <p:extLst>
+      <p:ext uri="{BB962C8B-B14F-4D97-AF65-F5344CB8AC3E}">
+        <p14:creationId xmlns:p14="http://schemas.microsoft.com/office/powerpoint/2010/main" val="1391670323"/>
+      </p:ext>
+    </p:extLst>
+  </p:cSld>
+  <p:clrMapOvr>
+    <a:masterClrMapping/>
+  </p:clrMapOvr>
+</p:sld>
+</file>
+
+<file path=ppt/slides/slide61.xml><?xml version="1.0" encoding="utf-8"?>
+<p:sld xmlns:a="http://schemas.openxmlformats.org/drawingml/2006/main" xmlns:r="http://schemas.openxmlformats.org/officeDocument/2006/relationships" xmlns:p="http://schemas.openxmlformats.org/presentationml/2006/main">
+  <p:cSld>
+    <p:spTree>
+      <p:nvGrpSpPr>
+        <p:cNvPr id="1" name=""/>
+        <p:cNvGrpSpPr/>
+        <p:nvPr/>
+      </p:nvGrpSpPr>
+      <p:grpSpPr>
+        <a:xfrm>
+          <a:off x="0" y="0"/>
+          <a:ext cx="0" cy="0"/>
+          <a:chOff x="0" y="0"/>
+          <a:chExt cx="0" cy="0"/>
+        </a:xfrm>
+      </p:grpSpPr>
+      <p:sp>
+        <p:nvSpPr>
+          <p:cNvPr id="2" name="Title 1"/>
+          <p:cNvSpPr>
+            <a:spLocks noGrp="1"/>
+          </p:cNvSpPr>
+          <p:nvPr>
+            <p:ph type="title"/>
+          </p:nvPr>
+        </p:nvSpPr>
+        <p:spPr/>
+        <p:txBody>
+          <a:bodyPr/>
+          <a:lstStyle/>
+          <a:p>
+            <a:r>
               <a:rPr lang="ru-RU" dirty="0" smtClean="0"/>
               <a:t>Литература</a:t>
             </a:r>
@@ -15580,11 +15497,7 @@
             </a:r>
             <a:r>
               <a:rPr lang="en-US"/>
-              <a:t>://</a:t>
-            </a:r>
-            <a:r>
-              <a:rPr lang="en-US"/>
-              <a:t>gcc.gnu.org/onlinedocs/cpp</a:t>
+              <a:t>://gcc.gnu.org/onlinedocs/cpp</a:t>
             </a:r>
             <a:r>
               <a:rPr lang="en-US" smtClean="0"/>
@@ -15608,11 +15521,7 @@
           <a:p>
             <a:r>
               <a:rPr lang="en-US"/>
-              <a:t> </a:t>
-            </a:r>
-            <a:r>
-              <a:rPr lang="en-US"/>
-              <a:t>Jonathan </a:t>
+              <a:t> Jonathan </a:t>
             </a:r>
             <a:r>
               <a:rPr lang="en-US" smtClean="0"/>
@@ -15620,11 +15529,7 @@
             </a:r>
             <a:r>
               <a:rPr lang="en-US"/>
-              <a:t>C </a:t>
-            </a:r>
-            <a:r>
-              <a:rPr lang="en-US"/>
-              <a:t>Pre-Processor </a:t>
+              <a:t>C Pre-Processor </a:t>
             </a:r>
             <a:r>
               <a:rPr lang="en-US" smtClean="0"/>
@@ -15635,11 +15540,7 @@
           <a:p>
             <a:r>
               <a:rPr lang="en-US"/>
-              <a:t>Davide Vandevoorde, Nicolai M. Josuttis, C++ Templates. The Complete Guide, Pearson Education</a:t>
-            </a:r>
-            <a:r>
-              <a:rPr lang="en-US"/>
-              <a:t>, </a:t>
+              <a:t>Davide Vandevoorde, Nicolai M. Josuttis, C++ Templates. The Complete Guide, Pearson Education, </a:t>
             </a:r>
             <a:r>
               <a:rPr lang="en-US" smtClean="0"/>

</xml_diff>

<commit_message>
Slides draft, couple examples and some lecture text on smartpointers. Hardest lecture in the course, as for me. Work will be proceed.
git-svn-id: https://svn.code.sf.net/p/cpp-lects-rus/code/trunk@215 39143b06-f351-456c-9f92-4cd32fad6823
</commit_message>
<xml_diff>
--- a/slides/sep2017/02-preprocessor.pptx
+++ b/slides/sep2017/02-preprocessor.pptx
@@ -66,6 +66,11 @@
     <p:sldId id="311" r:id="rId60"/>
     <p:sldId id="318" r:id="rId61"/>
     <p:sldId id="258" r:id="rId62"/>
+    <p:sldId id="319" r:id="rId63"/>
+    <p:sldId id="320" r:id="rId64"/>
+    <p:sldId id="321" r:id="rId65"/>
+    <p:sldId id="322" r:id="rId66"/>
+    <p:sldId id="323" r:id="rId67"/>
   </p:sldIdLst>
   <p:sldSz cx="12192000" cy="6858000"/>
   <p:notesSz cx="6858000" cy="9144000"/>
@@ -369,7 +374,7 @@
             <a:fld id="{96DFF08F-DC6B-4601-B491-B0F83F6DD2DA}" type="datetimeFigureOut">
               <a:rPr lang="en-US" dirty="0"/>
               <a:pPr/>
-              <a:t>8/15/2017</a:t>
+              <a:t>8/30/2017</a:t>
             </a:fld>
             <a:endParaRPr lang="en-US" dirty="0"/>
           </a:p>
@@ -586,7 +591,7 @@
           <a:p>
             <a:fld id="{96DFF08F-DC6B-4601-B491-B0F83F6DD2DA}" type="datetimeFigureOut">
               <a:rPr lang="en-US" dirty="0"/>
-              <a:t>8/15/2017</a:t>
+              <a:t>8/30/2017</a:t>
             </a:fld>
             <a:endParaRPr lang="en-US" dirty="0"/>
           </a:p>
@@ -761,7 +766,7 @@
           <a:p>
             <a:fld id="{96DFF08F-DC6B-4601-B491-B0F83F6DD2DA}" type="datetimeFigureOut">
               <a:rPr lang="en-US" dirty="0"/>
-              <a:t>8/15/2017</a:t>
+              <a:t>8/30/2017</a:t>
             </a:fld>
             <a:endParaRPr lang="en-US" dirty="0"/>
           </a:p>
@@ -926,7 +931,7 @@
           <a:p>
             <a:fld id="{96DFF08F-DC6B-4601-B491-B0F83F6DD2DA}" type="datetimeFigureOut">
               <a:rPr lang="en-US" dirty="0"/>
-              <a:t>8/15/2017</a:t>
+              <a:t>8/30/2017</a:t>
             </a:fld>
             <a:endParaRPr lang="en-US" dirty="0"/>
           </a:p>
@@ -1172,7 +1177,7 @@
           <a:p>
             <a:fld id="{96DFF08F-DC6B-4601-B491-B0F83F6DD2DA}" type="datetimeFigureOut">
               <a:rPr lang="en-US" dirty="0"/>
-              <a:t>8/15/2017</a:t>
+              <a:t>8/30/2017</a:t>
             </a:fld>
             <a:endParaRPr lang="en-US" dirty="0"/>
           </a:p>
@@ -1490,7 +1495,7 @@
           <a:p>
             <a:fld id="{96DFF08F-DC6B-4601-B491-B0F83F6DD2DA}" type="datetimeFigureOut">
               <a:rPr lang="en-US" dirty="0"/>
-              <a:t>8/15/2017</a:t>
+              <a:t>8/30/2017</a:t>
             </a:fld>
             <a:endParaRPr lang="en-US" dirty="0"/>
           </a:p>
@@ -1909,7 +1914,7 @@
           <a:p>
             <a:fld id="{96DFF08F-DC6B-4601-B491-B0F83F6DD2DA}" type="datetimeFigureOut">
               <a:rPr lang="en-US" dirty="0"/>
-              <a:t>8/15/2017</a:t>
+              <a:t>8/30/2017</a:t>
             </a:fld>
             <a:endParaRPr lang="en-US" dirty="0"/>
           </a:p>
@@ -2022,7 +2027,7 @@
           <a:p>
             <a:fld id="{96DFF08F-DC6B-4601-B491-B0F83F6DD2DA}" type="datetimeFigureOut">
               <a:rPr lang="en-US" dirty="0"/>
-              <a:t>8/15/2017</a:t>
+              <a:t>8/30/2017</a:t>
             </a:fld>
             <a:endParaRPr lang="en-US" dirty="0"/>
           </a:p>
@@ -2112,7 +2117,7 @@
           <a:p>
             <a:fld id="{96DFF08F-DC6B-4601-B491-B0F83F6DD2DA}" type="datetimeFigureOut">
               <a:rPr lang="en-US" dirty="0"/>
-              <a:t>8/15/2017</a:t>
+              <a:t>8/30/2017</a:t>
             </a:fld>
             <a:endParaRPr lang="en-US" dirty="0"/>
           </a:p>
@@ -2397,7 +2402,7 @@
           <a:p>
             <a:fld id="{96DFF08F-DC6B-4601-B491-B0F83F6DD2DA}" type="datetimeFigureOut">
               <a:rPr lang="en-US" dirty="0"/>
-              <a:t>8/15/2017</a:t>
+              <a:t>8/30/2017</a:t>
             </a:fld>
             <a:endParaRPr lang="en-US" dirty="0"/>
           </a:p>
@@ -2664,7 +2669,7 @@
           <a:p>
             <a:fld id="{96DFF08F-DC6B-4601-B491-B0F83F6DD2DA}" type="datetimeFigureOut">
               <a:rPr lang="en-US" dirty="0"/>
-              <a:t>8/15/2017</a:t>
+              <a:t>8/30/2017</a:t>
             </a:fld>
             <a:endParaRPr lang="en-US" dirty="0"/>
           </a:p>
@@ -2913,7 +2918,7 @@
             <a:fld id="{96DFF08F-DC6B-4601-B491-B0F83F6DD2DA}" type="datetimeFigureOut">
               <a:rPr lang="en-US" dirty="0"/>
               <a:pPr/>
-              <a:t>8/15/2017</a:t>
+              <a:t>8/30/2017</a:t>
             </a:fld>
             <a:endParaRPr lang="en-US" dirty="0"/>
           </a:p>
@@ -6262,7 +6267,48 @@
           <a:p>
             <a:r>
               <a:rPr lang="ru-RU" smtClean="0"/>
-              <a:t>Как можно было догадаться, на следующем слайде будет неожиданный аргумент за макросы</a:t>
+              <a:t>Вопрос не так прост, у обоих подходов есть плюс и минусы</a:t>
+            </a:r>
+          </a:p>
+          <a:p>
+            <a:r>
+              <a:rPr lang="ru-RU" smtClean="0"/>
+              <a:t>Шаблоны функций:</a:t>
+            </a:r>
+          </a:p>
+          <a:p>
+            <a:pPr lvl="1"/>
+            <a:r>
+              <a:rPr lang="ru-RU" smtClean="0"/>
+              <a:t>Безопасней относительно типов</a:t>
+            </a:r>
+          </a:p>
+          <a:p>
+            <a:pPr lvl="1"/>
+            <a:r>
+              <a:rPr lang="ru-RU" smtClean="0"/>
+              <a:t>Позволяют перегрузку. Например подумайте о поднятой в прошлый раз проблеме </a:t>
+            </a:r>
+            <a:r>
+              <a:rPr lang="en-US" smtClean="0"/>
+              <a:t>operator== </a:t>
+            </a:r>
+            <a:r>
+              <a:rPr lang="ru-RU" smtClean="0"/>
+              <a:t>для строк. Вы не хотели бы писать макрос для такого оператора, так как он будет распространяться на сравнение всего вообще</a:t>
+            </a:r>
+          </a:p>
+          <a:p>
+            <a:r>
+              <a:rPr lang="ru-RU" smtClean="0"/>
+              <a:t>Макросы</a:t>
+            </a:r>
+          </a:p>
+          <a:p>
+            <a:pPr lvl="1"/>
+            <a:r>
+              <a:rPr lang="ru-RU" smtClean="0"/>
+              <a:t>Обладают возможностями к чёрной магии</a:t>
             </a:r>
             <a:endParaRPr lang="en-US"/>
           </a:p>
@@ -15240,13 +15286,7 @@
               <a:rPr lang="fr-FR">
                 <a:latin typeface="Consolas" pitchFamily="49"/>
               </a:rPr>
-              <a:t>template &lt;</a:t>
-            </a:r>
-            <a:r>
-              <a:rPr lang="fr-FR">
-                <a:latin typeface="Consolas" pitchFamily="49"/>
-              </a:rPr>
-              <a:t>typename </a:t>
+              <a:t>template &lt;typename </a:t>
             </a:r>
             <a:r>
               <a:rPr lang="fr-FR" smtClean="0">
@@ -15556,6 +15596,898 @@
     <p:extLst>
       <p:ext uri="{BB962C8B-B14F-4D97-AF65-F5344CB8AC3E}">
         <p14:creationId xmlns:p14="http://schemas.microsoft.com/office/powerpoint/2010/main" val="1719869055"/>
+      </p:ext>
+    </p:extLst>
+  </p:cSld>
+  <p:clrMapOvr>
+    <a:masterClrMapping/>
+  </p:clrMapOvr>
+</p:sld>
+</file>
+
+<file path=ppt/slides/slide62.xml><?xml version="1.0" encoding="utf-8"?>
+<p:sld xmlns:a="http://schemas.openxmlformats.org/drawingml/2006/main" xmlns:r="http://schemas.openxmlformats.org/officeDocument/2006/relationships" xmlns:p="http://schemas.openxmlformats.org/presentationml/2006/main">
+  <p:cSld>
+    <p:spTree>
+      <p:nvGrpSpPr>
+        <p:cNvPr id="1" name=""/>
+        <p:cNvGrpSpPr/>
+        <p:nvPr/>
+      </p:nvGrpSpPr>
+      <p:grpSpPr>
+        <a:xfrm>
+          <a:off x="0" y="0"/>
+          <a:ext cx="0" cy="0"/>
+          <a:chOff x="0" y="0"/>
+          <a:chExt cx="0" cy="0"/>
+        </a:xfrm>
+      </p:grpSpPr>
+      <p:sp>
+        <p:nvSpPr>
+          <p:cNvPr id="4" name="Title 3"/>
+          <p:cNvSpPr>
+            <a:spLocks noGrp="1"/>
+          </p:cNvSpPr>
+          <p:nvPr>
+            <p:ph type="title"/>
+          </p:nvPr>
+        </p:nvSpPr>
+        <p:spPr/>
+        <p:txBody>
+          <a:bodyPr/>
+          <a:lstStyle/>
+          <a:p>
+            <a:r>
+              <a:rPr lang="ru-RU" smtClean="0"/>
+              <a:t>секретный уровень</a:t>
+            </a:r>
+            <a:endParaRPr lang="en-US"/>
+          </a:p>
+        </p:txBody>
+      </p:sp>
+      <p:sp>
+        <p:nvSpPr>
+          <p:cNvPr id="5" name="Text Placeholder 4"/>
+          <p:cNvSpPr>
+            <a:spLocks noGrp="1"/>
+          </p:cNvSpPr>
+          <p:nvPr>
+            <p:ph type="body" idx="1"/>
+          </p:nvPr>
+        </p:nvSpPr>
+        <p:spPr/>
+        <p:txBody>
+          <a:bodyPr/>
+          <a:lstStyle/>
+          <a:p>
+            <a:r>
+              <a:rPr lang="ru-RU" smtClean="0"/>
+              <a:t>Подключаем </a:t>
+            </a:r>
+            <a:r>
+              <a:rPr lang="en-US" smtClean="0"/>
+              <a:t>boost::preprocessor</a:t>
+            </a:r>
+            <a:endParaRPr lang="en-US"/>
+          </a:p>
+        </p:txBody>
+      </p:sp>
+    </p:spTree>
+    <p:extLst>
+      <p:ext uri="{BB962C8B-B14F-4D97-AF65-F5344CB8AC3E}">
+        <p14:creationId xmlns:p14="http://schemas.microsoft.com/office/powerpoint/2010/main" val="2961280947"/>
+      </p:ext>
+    </p:extLst>
+  </p:cSld>
+  <p:clrMapOvr>
+    <a:masterClrMapping/>
+  </p:clrMapOvr>
+</p:sld>
+</file>
+
+<file path=ppt/slides/slide63.xml><?xml version="1.0" encoding="utf-8"?>
+<p:sld xmlns:a="http://schemas.openxmlformats.org/drawingml/2006/main" xmlns:r="http://schemas.openxmlformats.org/officeDocument/2006/relationships" xmlns:p="http://schemas.openxmlformats.org/presentationml/2006/main">
+  <p:cSld>
+    <p:spTree>
+      <p:nvGrpSpPr>
+        <p:cNvPr id="1" name=""/>
+        <p:cNvGrpSpPr/>
+        <p:nvPr/>
+      </p:nvGrpSpPr>
+      <p:grpSpPr>
+        <a:xfrm>
+          <a:off x="0" y="0"/>
+          <a:ext cx="0" cy="0"/>
+          <a:chOff x="0" y="0"/>
+          <a:chExt cx="0" cy="0"/>
+        </a:xfrm>
+      </p:grpSpPr>
+      <p:sp>
+        <p:nvSpPr>
+          <p:cNvPr id="4" name="Title 3"/>
+          <p:cNvSpPr>
+            <a:spLocks noGrp="1"/>
+          </p:cNvSpPr>
+          <p:nvPr>
+            <p:ph type="title"/>
+          </p:nvPr>
+        </p:nvSpPr>
+        <p:spPr/>
+        <p:txBody>
+          <a:bodyPr/>
+          <a:lstStyle/>
+          <a:p>
+            <a:r>
+              <a:rPr lang="ru-RU" smtClean="0"/>
+              <a:t>Мета препроцессинг</a:t>
+            </a:r>
+            <a:endParaRPr lang="en-US"/>
+          </a:p>
+        </p:txBody>
+      </p:sp>
+      <p:sp>
+        <p:nvSpPr>
+          <p:cNvPr id="5" name="Content Placeholder 4"/>
+          <p:cNvSpPr>
+            <a:spLocks noGrp="1"/>
+          </p:cNvSpPr>
+          <p:nvPr>
+            <p:ph idx="1"/>
+          </p:nvPr>
+        </p:nvSpPr>
+        <p:spPr/>
+        <p:txBody>
+          <a:bodyPr/>
+          <a:lstStyle/>
+          <a:p>
+            <a:r>
+              <a:rPr lang="ru-RU" smtClean="0"/>
+              <a:t>Взрослый макропроцессинг предполагает некоторые возможности к метапрограммированию</a:t>
+            </a:r>
+          </a:p>
+          <a:p>
+            <a:r>
+              <a:rPr lang="ru-RU" smtClean="0"/>
+              <a:t>Теоретическая основа была заложена в работе Абрамса и Гуртового. Выдержка доступна по ссылке</a:t>
+            </a:r>
+          </a:p>
+          <a:p>
+            <a:pPr marL="45720" indent="0">
+              <a:buNone/>
+            </a:pPr>
+            <a:r>
+              <a:rPr lang="en-US"/>
+              <a:t>http</a:t>
+            </a:r>
+            <a:r>
+              <a:rPr lang="en-US"/>
+              <a:t>://</a:t>
+            </a:r>
+            <a:r>
+              <a:rPr lang="en-US" smtClean="0"/>
+              <a:t>www.boost.org/doc/libs/1_63_0/libs/preprocessor/doc/AppendixA-AnIntroductiontoPreprocessorMetaprogramming.html</a:t>
+            </a:r>
+            <a:endParaRPr lang="ru-RU" smtClean="0"/>
+          </a:p>
+          <a:p>
+            <a:r>
+              <a:rPr lang="ru-RU" smtClean="0"/>
+              <a:t>Эти идеи вылились в </a:t>
+            </a:r>
+            <a:r>
+              <a:rPr lang="en-US" smtClean="0"/>
+              <a:t>boost library preprocessor subset</a:t>
+            </a:r>
+            <a:endParaRPr lang="en-US"/>
+          </a:p>
+        </p:txBody>
+      </p:sp>
+    </p:spTree>
+    <p:extLst>
+      <p:ext uri="{BB962C8B-B14F-4D97-AF65-F5344CB8AC3E}">
+        <p14:creationId xmlns:p14="http://schemas.microsoft.com/office/powerpoint/2010/main" val="2089194627"/>
+      </p:ext>
+    </p:extLst>
+  </p:cSld>
+  <p:clrMapOvr>
+    <a:masterClrMapping/>
+  </p:clrMapOvr>
+</p:sld>
+</file>
+
+<file path=ppt/slides/slide64.xml><?xml version="1.0" encoding="utf-8"?>
+<p:sld xmlns:a="http://schemas.openxmlformats.org/drawingml/2006/main" xmlns:r="http://schemas.openxmlformats.org/officeDocument/2006/relationships" xmlns:p="http://schemas.openxmlformats.org/presentationml/2006/main">
+  <p:cSld>
+    <p:spTree>
+      <p:nvGrpSpPr>
+        <p:cNvPr id="1" name=""/>
+        <p:cNvGrpSpPr/>
+        <p:nvPr/>
+      </p:nvGrpSpPr>
+      <p:grpSpPr>
+        <a:xfrm>
+          <a:off x="0" y="0"/>
+          <a:ext cx="0" cy="0"/>
+          <a:chOff x="0" y="0"/>
+          <a:chExt cx="0" cy="0"/>
+        </a:xfrm>
+      </p:grpSpPr>
+      <p:sp>
+        <p:nvSpPr>
+          <p:cNvPr id="2" name="Title 1"/>
+          <p:cNvSpPr>
+            <a:spLocks noGrp="1"/>
+          </p:cNvSpPr>
+          <p:nvPr>
+            <p:ph type="title"/>
+          </p:nvPr>
+        </p:nvSpPr>
+        <p:spPr/>
+        <p:txBody>
+          <a:bodyPr/>
+          <a:lstStyle/>
+          <a:p>
+            <a:r>
+              <a:rPr lang="ru-RU" smtClean="0"/>
+              <a:t>Проблема: </a:t>
+            </a:r>
+            <a:r>
+              <a:rPr lang="en-US" smtClean="0"/>
+              <a:t>catch handlers</a:t>
+            </a:r>
+            <a:endParaRPr lang="en-US"/>
+          </a:p>
+        </p:txBody>
+      </p:sp>
+      <p:sp>
+        <p:nvSpPr>
+          <p:cNvPr id="3" name="Content Placeholder 2"/>
+          <p:cNvSpPr>
+            <a:spLocks noGrp="1"/>
+          </p:cNvSpPr>
+          <p:nvPr>
+            <p:ph idx="1"/>
+          </p:nvPr>
+        </p:nvSpPr>
+        <p:spPr/>
+        <p:txBody>
+          <a:bodyPr/>
+          <a:lstStyle/>
+          <a:p>
+            <a:r>
+              <a:rPr lang="ru-RU" smtClean="0"/>
+              <a:t>Хочется поймать любой встроенный тип</a:t>
+            </a:r>
+          </a:p>
+          <a:p>
+            <a:pPr marL="45720" indent="0">
+              <a:buNone/>
+            </a:pPr>
+            <a:r>
+              <a:rPr lang="en-US" smtClean="0">
+                <a:latin typeface="Consolas" panose="020B0609020204030204" pitchFamily="49" charset="0"/>
+              </a:rPr>
+              <a:t>try</a:t>
+            </a:r>
+            <a:r>
+              <a:rPr lang="ru-RU" smtClean="0">
+                <a:latin typeface="Consolas" panose="020B0609020204030204" pitchFamily="49" charset="0"/>
+              </a:rPr>
+              <a:t> </a:t>
+            </a:r>
+            <a:r>
+              <a:rPr lang="en-US" smtClean="0">
+                <a:latin typeface="Consolas" panose="020B0609020204030204" pitchFamily="49" charset="0"/>
+              </a:rPr>
+              <a:t>{</a:t>
+            </a:r>
+            <a:r>
+              <a:rPr lang="ru-RU" smtClean="0">
+                <a:latin typeface="Consolas" panose="020B0609020204030204" pitchFamily="49" charset="0"/>
+              </a:rPr>
+              <a:t/>
+            </a:r>
+            <a:br>
+              <a:rPr lang="ru-RU" smtClean="0">
+                <a:latin typeface="Consolas" panose="020B0609020204030204" pitchFamily="49" charset="0"/>
+              </a:rPr>
+            </a:br>
+            <a:r>
+              <a:rPr lang="ru-RU">
+                <a:latin typeface="Consolas" panose="020B0609020204030204" pitchFamily="49" charset="0"/>
+              </a:rPr>
+              <a:t> </a:t>
+            </a:r>
+            <a:r>
+              <a:rPr lang="ru-RU" smtClean="0">
+                <a:latin typeface="Consolas" panose="020B0609020204030204" pitchFamily="49" charset="0"/>
+              </a:rPr>
+              <a:t> </a:t>
+            </a:r>
+            <a:r>
+              <a:rPr lang="en-US" smtClean="0">
+                <a:latin typeface="Consolas" panose="020B0609020204030204" pitchFamily="49" charset="0"/>
+              </a:rPr>
+              <a:t>// </a:t>
+            </a:r>
+            <a:r>
+              <a:rPr lang="ru-RU" smtClean="0">
+                <a:latin typeface="Consolas" panose="020B0609020204030204" pitchFamily="49" charset="0"/>
+              </a:rPr>
+              <a:t>какой-то код</a:t>
+            </a:r>
+            <a:br>
+              <a:rPr lang="ru-RU" smtClean="0">
+                <a:latin typeface="Consolas" panose="020B0609020204030204" pitchFamily="49" charset="0"/>
+              </a:rPr>
+            </a:br>
+            <a:r>
+              <a:rPr lang="en-US" smtClean="0">
+                <a:latin typeface="Consolas" panose="020B0609020204030204" pitchFamily="49" charset="0"/>
+              </a:rPr>
+              <a:t>}</a:t>
+            </a:r>
+            <a:br>
+              <a:rPr lang="en-US" smtClean="0">
+                <a:latin typeface="Consolas" panose="020B0609020204030204" pitchFamily="49" charset="0"/>
+              </a:rPr>
+            </a:br>
+            <a:r>
+              <a:rPr lang="en-US" smtClean="0">
+                <a:latin typeface="Consolas" panose="020B0609020204030204" pitchFamily="49" charset="0"/>
+              </a:rPr>
+              <a:t>catch (int i) { cout &lt;&lt; i;</a:t>
+            </a:r>
+            <a:r>
+              <a:rPr lang="ru-RU" smtClean="0">
+                <a:latin typeface="Consolas" panose="020B0609020204030204" pitchFamily="49" charset="0"/>
+              </a:rPr>
+              <a:t> </a:t>
+            </a:r>
+            <a:r>
+              <a:rPr lang="en-US" smtClean="0">
+                <a:latin typeface="Consolas" panose="020B0609020204030204" pitchFamily="49" charset="0"/>
+              </a:rPr>
+              <a:t>}</a:t>
+            </a:r>
+            <a:br>
+              <a:rPr lang="en-US" smtClean="0">
+                <a:latin typeface="Consolas" panose="020B0609020204030204" pitchFamily="49" charset="0"/>
+              </a:rPr>
+            </a:br>
+            <a:r>
+              <a:rPr lang="en-US" smtClean="0">
+                <a:latin typeface="Consolas" panose="020B0609020204030204" pitchFamily="49" charset="0"/>
+              </a:rPr>
+              <a:t>catch (unsigned u) { cout &lt;&lt; u; }</a:t>
+            </a:r>
+            <a:br>
+              <a:rPr lang="en-US" smtClean="0">
+                <a:latin typeface="Consolas" panose="020B0609020204030204" pitchFamily="49" charset="0"/>
+              </a:rPr>
+            </a:br>
+            <a:r>
+              <a:rPr lang="en-US" smtClean="0">
+                <a:latin typeface="Consolas" panose="020B0609020204030204" pitchFamily="49" charset="0"/>
+              </a:rPr>
+              <a:t>// </a:t>
+            </a:r>
+            <a:r>
+              <a:rPr lang="ru-RU" smtClean="0">
+                <a:latin typeface="Consolas" panose="020B0609020204030204" pitchFamily="49" charset="0"/>
+              </a:rPr>
+              <a:t>а ведь ещё </a:t>
+            </a:r>
+            <a:r>
+              <a:rPr lang="en-US" smtClean="0">
+                <a:latin typeface="Consolas" panose="020B0609020204030204" pitchFamily="49" charset="0"/>
+              </a:rPr>
+              <a:t>short </a:t>
+            </a:r>
+            <a:r>
+              <a:rPr lang="ru-RU" smtClean="0">
+                <a:latin typeface="Consolas" panose="020B0609020204030204" pitchFamily="49" charset="0"/>
+              </a:rPr>
+              <a:t>и </a:t>
+            </a:r>
+            <a:r>
+              <a:rPr lang="en-US" smtClean="0">
+                <a:latin typeface="Consolas" panose="020B0609020204030204" pitchFamily="49" charset="0"/>
+              </a:rPr>
+              <a:t>long </a:t>
+            </a:r>
+            <a:r>
+              <a:rPr lang="ru-RU" smtClean="0">
+                <a:latin typeface="Consolas" panose="020B0609020204030204" pitchFamily="49" charset="0"/>
+              </a:rPr>
+              <a:t>и </a:t>
+            </a:r>
+            <a:r>
+              <a:rPr lang="en-US" smtClean="0">
+                <a:latin typeface="Consolas" panose="020B0609020204030204" pitchFamily="49" charset="0"/>
+              </a:rPr>
+              <a:t>long long, </a:t>
+            </a:r>
+            <a:r>
+              <a:rPr lang="ru-RU" smtClean="0">
+                <a:latin typeface="Consolas" panose="020B0609020204030204" pitchFamily="49" charset="0"/>
+              </a:rPr>
+              <a:t>это утомляет</a:t>
+            </a:r>
+            <a:r>
+              <a:rPr lang="en-US" smtClean="0">
+                <a:latin typeface="Consolas" panose="020B0609020204030204" pitchFamily="49" charset="0"/>
+              </a:rPr>
+              <a:t> </a:t>
+            </a:r>
+            <a:endParaRPr lang="en-US">
+              <a:latin typeface="Consolas" panose="020B0609020204030204" pitchFamily="49" charset="0"/>
+            </a:endParaRPr>
+          </a:p>
+          <a:p>
+            <a:pPr marL="45720" indent="0">
+              <a:buNone/>
+            </a:pPr>
+            <a:r>
+              <a:rPr lang="ru-RU" smtClean="0"/>
+              <a:t>Идея для решения:</a:t>
+            </a:r>
+            <a:r>
+              <a:rPr lang="en-US" smtClean="0"/>
+              <a:t> </a:t>
+            </a:r>
+            <a:endParaRPr lang="ru-RU" smtClean="0"/>
+          </a:p>
+          <a:p>
+            <a:pPr marL="45720" indent="0">
+              <a:buNone/>
+            </a:pPr>
+            <a:r>
+              <a:rPr lang="en-US" smtClean="0">
+                <a:latin typeface="Consolas" panose="020B0609020204030204" pitchFamily="49" charset="0"/>
+              </a:rPr>
+              <a:t>BOOST_PP_LIST_FOR_EACH(CATCH</a:t>
+            </a:r>
+            <a:r>
+              <a:rPr lang="en-US">
+                <a:latin typeface="Consolas" panose="020B0609020204030204" pitchFamily="49" charset="0"/>
+              </a:rPr>
+              <a:t>, _, BUILTIN_TYPES)</a:t>
+            </a:r>
+          </a:p>
+        </p:txBody>
+      </p:sp>
+    </p:spTree>
+    <p:extLst>
+      <p:ext uri="{BB962C8B-B14F-4D97-AF65-F5344CB8AC3E}">
+        <p14:creationId xmlns:p14="http://schemas.microsoft.com/office/powerpoint/2010/main" val="2266246945"/>
+      </p:ext>
+    </p:extLst>
+  </p:cSld>
+  <p:clrMapOvr>
+    <a:masterClrMapping/>
+  </p:clrMapOvr>
+</p:sld>
+</file>
+
+<file path=ppt/slides/slide65.xml><?xml version="1.0" encoding="utf-8"?>
+<p:sld xmlns:a="http://schemas.openxmlformats.org/drawingml/2006/main" xmlns:r="http://schemas.openxmlformats.org/officeDocument/2006/relationships" xmlns:p="http://schemas.openxmlformats.org/presentationml/2006/main">
+  <p:cSld>
+    <p:spTree>
+      <p:nvGrpSpPr>
+        <p:cNvPr id="1" name=""/>
+        <p:cNvGrpSpPr/>
+        <p:nvPr/>
+      </p:nvGrpSpPr>
+      <p:grpSpPr>
+        <a:xfrm>
+          <a:off x="0" y="0"/>
+          <a:ext cx="0" cy="0"/>
+          <a:chOff x="0" y="0"/>
+          <a:chExt cx="0" cy="0"/>
+        </a:xfrm>
+      </p:grpSpPr>
+      <p:sp>
+        <p:nvSpPr>
+          <p:cNvPr id="2" name="Title 1"/>
+          <p:cNvSpPr>
+            <a:spLocks noGrp="1"/>
+          </p:cNvSpPr>
+          <p:nvPr>
+            <p:ph type="title"/>
+          </p:nvPr>
+        </p:nvSpPr>
+        <p:spPr/>
+        <p:txBody>
+          <a:bodyPr/>
+          <a:lstStyle/>
+          <a:p>
+            <a:r>
+              <a:rPr lang="ru-RU" smtClean="0"/>
+              <a:t>Макрос перечисляющий типы</a:t>
+            </a:r>
+            <a:endParaRPr lang="en-US"/>
+          </a:p>
+        </p:txBody>
+      </p:sp>
+      <p:sp>
+        <p:nvSpPr>
+          <p:cNvPr id="3" name="Content Placeholder 2"/>
+          <p:cNvSpPr>
+            <a:spLocks noGrp="1"/>
+          </p:cNvSpPr>
+          <p:nvPr>
+            <p:ph idx="1"/>
+          </p:nvPr>
+        </p:nvSpPr>
+        <p:spPr/>
+        <p:txBody>
+          <a:bodyPr/>
+          <a:lstStyle/>
+          <a:p>
+            <a:r>
+              <a:rPr lang="ru-RU" smtClean="0"/>
+              <a:t>Простое перечисление </a:t>
+            </a:r>
+            <a:r>
+              <a:rPr lang="en-US" smtClean="0"/>
+              <a:t>PP_TUPLE </a:t>
+            </a:r>
+            <a:r>
+              <a:rPr lang="ru-RU" smtClean="0"/>
+              <a:t>превращается в </a:t>
+            </a:r>
+            <a:r>
+              <a:rPr lang="en-US" smtClean="0"/>
+              <a:t>PP_LIST, </a:t>
+            </a:r>
+            <a:r>
+              <a:rPr lang="ru-RU" smtClean="0"/>
+              <a:t>позволяющий итерацию</a:t>
+            </a:r>
+            <a:endParaRPr lang="en-US" smtClean="0"/>
+          </a:p>
+          <a:p>
+            <a:pPr marL="45720" indent="0">
+              <a:buNone/>
+            </a:pPr>
+            <a:r>
+              <a:rPr lang="en-US">
+                <a:latin typeface="Consolas" panose="020B0609020204030204" pitchFamily="49" charset="0"/>
+              </a:rPr>
+              <a:t># define </a:t>
+            </a:r>
+            <a:r>
+              <a:rPr lang="en-US">
+                <a:latin typeface="Consolas" panose="020B0609020204030204" pitchFamily="49" charset="0"/>
+              </a:rPr>
+              <a:t>BUILTIN_TYPES </a:t>
+            </a:r>
+            <a:r>
+              <a:rPr lang="en-US" smtClean="0">
+                <a:latin typeface="Consolas" panose="020B0609020204030204" pitchFamily="49" charset="0"/>
+              </a:rPr>
+              <a:t>\</a:t>
+            </a:r>
+            <a:br>
+              <a:rPr lang="en-US" smtClean="0">
+                <a:latin typeface="Consolas" panose="020B0609020204030204" pitchFamily="49" charset="0"/>
+              </a:rPr>
+            </a:br>
+            <a:r>
+              <a:rPr lang="en-US" smtClean="0">
+                <a:latin typeface="Consolas" panose="020B0609020204030204" pitchFamily="49" charset="0"/>
+              </a:rPr>
+              <a:t>   </a:t>
+            </a:r>
+            <a:r>
+              <a:rPr lang="en-US">
+                <a:latin typeface="Consolas" panose="020B0609020204030204" pitchFamily="49" charset="0"/>
+              </a:rPr>
+              <a:t>BOOST_PP_TUPLE_TO_LIST</a:t>
+            </a:r>
+            <a:r>
+              <a:rPr lang="en-US">
+                <a:latin typeface="Consolas" panose="020B0609020204030204" pitchFamily="49" charset="0"/>
+              </a:rPr>
+              <a:t>( </a:t>
+            </a:r>
+            <a:r>
+              <a:rPr lang="en-US" smtClean="0">
+                <a:latin typeface="Consolas" panose="020B0609020204030204" pitchFamily="49" charset="0"/>
+              </a:rPr>
+              <a:t>\</a:t>
+            </a:r>
+            <a:br>
+              <a:rPr lang="en-US" smtClean="0">
+                <a:latin typeface="Consolas" panose="020B0609020204030204" pitchFamily="49" charset="0"/>
+              </a:rPr>
+            </a:br>
+            <a:r>
+              <a:rPr lang="en-US" smtClean="0">
+                <a:latin typeface="Consolas" panose="020B0609020204030204" pitchFamily="49" charset="0"/>
+              </a:rPr>
+              <a:t>      </a:t>
+            </a:r>
+            <a:r>
+              <a:rPr lang="en-US">
+                <a:latin typeface="Consolas" panose="020B0609020204030204" pitchFamily="49" charset="0"/>
+              </a:rPr>
+              <a:t>13</a:t>
+            </a:r>
+            <a:r>
+              <a:rPr lang="en-US">
+                <a:latin typeface="Consolas" panose="020B0609020204030204" pitchFamily="49" charset="0"/>
+              </a:rPr>
+              <a:t>, </a:t>
+            </a:r>
+            <a:r>
+              <a:rPr lang="en-US" smtClean="0">
+                <a:latin typeface="Consolas" panose="020B0609020204030204" pitchFamily="49" charset="0"/>
+              </a:rPr>
+              <a:t>( bool</a:t>
+            </a:r>
+            <a:r>
+              <a:rPr lang="en-US">
+                <a:latin typeface="Consolas" panose="020B0609020204030204" pitchFamily="49" charset="0"/>
+              </a:rPr>
+              <a:t>, </a:t>
+            </a:r>
+            <a:r>
+              <a:rPr lang="en-US" smtClean="0">
+                <a:latin typeface="Consolas" panose="020B0609020204030204" pitchFamily="49" charset="0"/>
+              </a:rPr>
+              <a:t>char</a:t>
+            </a:r>
+            <a:r>
+              <a:rPr lang="en-US">
+                <a:latin typeface="Consolas" panose="020B0609020204030204" pitchFamily="49" charset="0"/>
+              </a:rPr>
+              <a:t>, signed char, unsigned char</a:t>
+            </a:r>
+            <a:r>
+              <a:rPr lang="en-US">
+                <a:latin typeface="Consolas" panose="020B0609020204030204" pitchFamily="49" charset="0"/>
+              </a:rPr>
+              <a:t>, </a:t>
+            </a:r>
+            <a:r>
+              <a:rPr lang="en-US" smtClean="0">
+                <a:latin typeface="Consolas" panose="020B0609020204030204" pitchFamily="49" charset="0"/>
+              </a:rPr>
+              <a:t>\</a:t>
+            </a:r>
+            <a:br>
+              <a:rPr lang="en-US" smtClean="0">
+                <a:latin typeface="Consolas" panose="020B0609020204030204" pitchFamily="49" charset="0"/>
+              </a:rPr>
+            </a:br>
+            <a:r>
+              <a:rPr lang="en-US" smtClean="0">
+                <a:latin typeface="Consolas" panose="020B0609020204030204" pitchFamily="49" charset="0"/>
+              </a:rPr>
+              <a:t>            unsigned </a:t>
+            </a:r>
+            <a:r>
+              <a:rPr lang="en-US">
+                <a:latin typeface="Consolas" panose="020B0609020204030204" pitchFamily="49" charset="0"/>
+              </a:rPr>
+              <a:t>short</a:t>
+            </a:r>
+            <a:r>
+              <a:rPr lang="en-US">
+                <a:latin typeface="Consolas" panose="020B0609020204030204" pitchFamily="49" charset="0"/>
+              </a:rPr>
+              <a:t>, </a:t>
+            </a:r>
+            <a:r>
+              <a:rPr lang="en-US" smtClean="0">
+                <a:latin typeface="Consolas" panose="020B0609020204030204" pitchFamily="49" charset="0"/>
+              </a:rPr>
+              <a:t>short, int</a:t>
+            </a:r>
+            <a:r>
+              <a:rPr lang="en-US">
+                <a:latin typeface="Consolas" panose="020B0609020204030204" pitchFamily="49" charset="0"/>
+              </a:rPr>
+              <a:t>, unsigned</a:t>
+            </a:r>
+            <a:r>
+              <a:rPr lang="en-US">
+                <a:latin typeface="Consolas" panose="020B0609020204030204" pitchFamily="49" charset="0"/>
+              </a:rPr>
+              <a:t>, </a:t>
+            </a:r>
+            <a:r>
+              <a:rPr lang="en-US" smtClean="0">
+                <a:latin typeface="Consolas" panose="020B0609020204030204" pitchFamily="49" charset="0"/>
+              </a:rPr>
+              <a:t>\</a:t>
+            </a:r>
+            <a:br>
+              <a:rPr lang="en-US" smtClean="0">
+                <a:latin typeface="Consolas" panose="020B0609020204030204" pitchFamily="49" charset="0"/>
+              </a:rPr>
+            </a:br>
+            <a:r>
+              <a:rPr lang="en-US" smtClean="0">
+                <a:latin typeface="Consolas" panose="020B0609020204030204" pitchFamily="49" charset="0"/>
+              </a:rPr>
+              <a:t>            long</a:t>
+            </a:r>
+            <a:r>
+              <a:rPr lang="en-US">
+                <a:latin typeface="Consolas" panose="020B0609020204030204" pitchFamily="49" charset="0"/>
+              </a:rPr>
+              <a:t>, unsigned long</a:t>
+            </a:r>
+            <a:r>
+              <a:rPr lang="en-US">
+                <a:latin typeface="Consolas" panose="020B0609020204030204" pitchFamily="49" charset="0"/>
+              </a:rPr>
+              <a:t>, </a:t>
+            </a:r>
+            <a:r>
+              <a:rPr lang="en-US" smtClean="0">
+                <a:latin typeface="Consolas" panose="020B0609020204030204" pitchFamily="49" charset="0"/>
+              </a:rPr>
+              <a:t>\</a:t>
+            </a:r>
+            <a:br>
+              <a:rPr lang="en-US" smtClean="0">
+                <a:latin typeface="Consolas" panose="020B0609020204030204" pitchFamily="49" charset="0"/>
+              </a:rPr>
+            </a:br>
+            <a:r>
+              <a:rPr lang="en-US" smtClean="0">
+                <a:latin typeface="Consolas" panose="020B0609020204030204" pitchFamily="49" charset="0"/>
+              </a:rPr>
+              <a:t>            float</a:t>
+            </a:r>
+            <a:r>
+              <a:rPr lang="en-US">
+                <a:latin typeface="Consolas" panose="020B0609020204030204" pitchFamily="49" charset="0"/>
+              </a:rPr>
+              <a:t>, </a:t>
+            </a:r>
+            <a:r>
+              <a:rPr lang="en-US" smtClean="0">
+                <a:latin typeface="Consolas" panose="020B0609020204030204" pitchFamily="49" charset="0"/>
+              </a:rPr>
+              <a:t>double</a:t>
+            </a:r>
+            <a:r>
+              <a:rPr lang="en-US">
+                <a:latin typeface="Consolas" panose="020B0609020204030204" pitchFamily="49" charset="0"/>
+              </a:rPr>
+              <a:t>, long </a:t>
+            </a:r>
+            <a:r>
+              <a:rPr lang="en-US">
+                <a:latin typeface="Consolas" panose="020B0609020204030204" pitchFamily="49" charset="0"/>
+              </a:rPr>
+              <a:t>double </a:t>
+            </a:r>
+            <a:r>
+              <a:rPr lang="en-US" smtClean="0">
+                <a:latin typeface="Consolas" panose="020B0609020204030204" pitchFamily="49" charset="0"/>
+              </a:rPr>
+              <a:t>) \</a:t>
+            </a:r>
+            <a:br>
+              <a:rPr lang="en-US" smtClean="0">
+                <a:latin typeface="Consolas" panose="020B0609020204030204" pitchFamily="49" charset="0"/>
+              </a:rPr>
+            </a:br>
+            <a:r>
+              <a:rPr lang="en-US" smtClean="0">
+                <a:latin typeface="Consolas" panose="020B0609020204030204" pitchFamily="49" charset="0"/>
+              </a:rPr>
+              <a:t>   )</a:t>
+            </a:r>
+            <a:endParaRPr lang="ru-RU" smtClean="0">
+              <a:latin typeface="Consolas" panose="020B0609020204030204" pitchFamily="49" charset="0"/>
+            </a:endParaRPr>
+          </a:p>
+          <a:p>
+            <a:r>
+              <a:rPr lang="ru-RU" smtClean="0"/>
+              <a:t>Теперь всё, что осталось, это определить обработчик </a:t>
+            </a:r>
+            <a:r>
+              <a:rPr lang="en-US" smtClean="0"/>
+              <a:t>CATCH</a:t>
+            </a:r>
+            <a:endParaRPr lang="en-US"/>
+          </a:p>
+        </p:txBody>
+      </p:sp>
+    </p:spTree>
+    <p:extLst>
+      <p:ext uri="{BB962C8B-B14F-4D97-AF65-F5344CB8AC3E}">
+        <p14:creationId xmlns:p14="http://schemas.microsoft.com/office/powerpoint/2010/main" val="2518285471"/>
+      </p:ext>
+    </p:extLst>
+  </p:cSld>
+  <p:clrMapOvr>
+    <a:masterClrMapping/>
+  </p:clrMapOvr>
+</p:sld>
+</file>
+
+<file path=ppt/slides/slide66.xml><?xml version="1.0" encoding="utf-8"?>
+<p:sld xmlns:a="http://schemas.openxmlformats.org/drawingml/2006/main" xmlns:r="http://schemas.openxmlformats.org/officeDocument/2006/relationships" xmlns:p="http://schemas.openxmlformats.org/presentationml/2006/main">
+  <p:cSld>
+    <p:spTree>
+      <p:nvGrpSpPr>
+        <p:cNvPr id="1" name=""/>
+        <p:cNvGrpSpPr/>
+        <p:nvPr/>
+      </p:nvGrpSpPr>
+      <p:grpSpPr>
+        <a:xfrm>
+          <a:off x="0" y="0"/>
+          <a:ext cx="0" cy="0"/>
+          <a:chOff x="0" y="0"/>
+          <a:chExt cx="0" cy="0"/>
+        </a:xfrm>
+      </p:grpSpPr>
+      <p:sp>
+        <p:nvSpPr>
+          <p:cNvPr id="2" name="Title 1"/>
+          <p:cNvSpPr>
+            <a:spLocks noGrp="1"/>
+          </p:cNvSpPr>
+          <p:nvPr>
+            <p:ph type="title"/>
+          </p:nvPr>
+        </p:nvSpPr>
+        <p:spPr/>
+        <p:txBody>
+          <a:bodyPr/>
+          <a:lstStyle/>
+          <a:p>
+            <a:r>
+              <a:rPr lang="ru-RU" smtClean="0"/>
+              <a:t>Обсуждение</a:t>
+            </a:r>
+            <a:endParaRPr lang="en-US"/>
+          </a:p>
+        </p:txBody>
+      </p:sp>
+      <p:sp>
+        <p:nvSpPr>
+          <p:cNvPr id="3" name="Content Placeholder 2"/>
+          <p:cNvSpPr>
+            <a:spLocks noGrp="1"/>
+          </p:cNvSpPr>
+          <p:nvPr>
+            <p:ph idx="1"/>
+          </p:nvPr>
+        </p:nvSpPr>
+        <p:spPr/>
+        <p:txBody>
+          <a:bodyPr/>
+          <a:lstStyle/>
+          <a:p>
+            <a:r>
+              <a:rPr lang="ru-RU" smtClean="0"/>
+              <a:t>Это кажется несколько уродливым</a:t>
+            </a:r>
+          </a:p>
+          <a:p>
+            <a:r>
+              <a:rPr lang="ru-RU" smtClean="0"/>
+              <a:t>Но какие альтернативы?</a:t>
+            </a:r>
+            <a:endParaRPr lang="en-US"/>
+          </a:p>
+        </p:txBody>
+      </p:sp>
+    </p:spTree>
+    <p:extLst>
+      <p:ext uri="{BB962C8B-B14F-4D97-AF65-F5344CB8AC3E}">
+        <p14:creationId xmlns:p14="http://schemas.microsoft.com/office/powerpoint/2010/main" val="4087958433"/>
       </p:ext>
     </p:extLst>
   </p:cSld>

</xml_diff>